<commit_message>
GF#21969 fix diagram and annotate the paragraph
</commit_message>
<xml_diff>
--- a/diagrams/Quality Improvement Life Cycle.pptx
+++ b/diagrams/Quality Improvement Life Cycle.pptx
@@ -8,6 +8,7 @@
     <p:sldId id="267" r:id="rId2"/>
     <p:sldId id="268" r:id="rId3"/>
     <p:sldId id="269" r:id="rId4"/>
+    <p:sldId id="271" r:id="rId5"/>
   </p:sldIdLst>
   <p:sldSz cx="9144000" cy="6858000" type="screen4x3"/>
   <p:notesSz cx="6858000" cy="9144000"/>
@@ -245,7 +246,7 @@
           <a:p>
             <a:fld id="{80999DC0-E190-4E92-A646-DF8A2FBFFF53}" type="datetimeFigureOut">
               <a:rPr lang="en-US" smtClean="0"/>
-              <a:t>2/25/19</a:t>
+              <a:t>10/9/19</a:t>
             </a:fld>
             <a:endParaRPr lang="en-US"/>
           </a:p>
@@ -415,7 +416,7 @@
           <a:p>
             <a:fld id="{80999DC0-E190-4E92-A646-DF8A2FBFFF53}" type="datetimeFigureOut">
               <a:rPr lang="en-US" smtClean="0"/>
-              <a:t>2/25/19</a:t>
+              <a:t>10/9/19</a:t>
             </a:fld>
             <a:endParaRPr lang="en-US"/>
           </a:p>
@@ -595,7 +596,7 @@
           <a:p>
             <a:fld id="{80999DC0-E190-4E92-A646-DF8A2FBFFF53}" type="datetimeFigureOut">
               <a:rPr lang="en-US" smtClean="0"/>
-              <a:t>2/25/19</a:t>
+              <a:t>10/9/19</a:t>
             </a:fld>
             <a:endParaRPr lang="en-US"/>
           </a:p>
@@ -765,7 +766,7 @@
           <a:p>
             <a:fld id="{80999DC0-E190-4E92-A646-DF8A2FBFFF53}" type="datetimeFigureOut">
               <a:rPr lang="en-US" smtClean="0"/>
-              <a:t>2/25/19</a:t>
+              <a:t>10/9/19</a:t>
             </a:fld>
             <a:endParaRPr lang="en-US"/>
           </a:p>
@@ -1009,7 +1010,7 @@
           <a:p>
             <a:fld id="{80999DC0-E190-4E92-A646-DF8A2FBFFF53}" type="datetimeFigureOut">
               <a:rPr lang="en-US" smtClean="0"/>
-              <a:t>2/25/19</a:t>
+              <a:t>10/9/19</a:t>
             </a:fld>
             <a:endParaRPr lang="en-US"/>
           </a:p>
@@ -1241,7 +1242,7 @@
           <a:p>
             <a:fld id="{80999DC0-E190-4E92-A646-DF8A2FBFFF53}" type="datetimeFigureOut">
               <a:rPr lang="en-US" smtClean="0"/>
-              <a:t>2/25/19</a:t>
+              <a:t>10/9/19</a:t>
             </a:fld>
             <a:endParaRPr lang="en-US"/>
           </a:p>
@@ -1608,7 +1609,7 @@
           <a:p>
             <a:fld id="{80999DC0-E190-4E92-A646-DF8A2FBFFF53}" type="datetimeFigureOut">
               <a:rPr lang="en-US" smtClean="0"/>
-              <a:t>2/25/19</a:t>
+              <a:t>10/9/19</a:t>
             </a:fld>
             <a:endParaRPr lang="en-US"/>
           </a:p>
@@ -1726,7 +1727,7 @@
           <a:p>
             <a:fld id="{80999DC0-E190-4E92-A646-DF8A2FBFFF53}" type="datetimeFigureOut">
               <a:rPr lang="en-US" smtClean="0"/>
-              <a:t>2/25/19</a:t>
+              <a:t>10/9/19</a:t>
             </a:fld>
             <a:endParaRPr lang="en-US"/>
           </a:p>
@@ -1821,7 +1822,7 @@
           <a:p>
             <a:fld id="{80999DC0-E190-4E92-A646-DF8A2FBFFF53}" type="datetimeFigureOut">
               <a:rPr lang="en-US" smtClean="0"/>
-              <a:t>2/25/19</a:t>
+              <a:t>10/9/19</a:t>
             </a:fld>
             <a:endParaRPr lang="en-US"/>
           </a:p>
@@ -2098,7 +2099,7 @@
           <a:p>
             <a:fld id="{80999DC0-E190-4E92-A646-DF8A2FBFFF53}" type="datetimeFigureOut">
               <a:rPr lang="en-US" smtClean="0"/>
-              <a:t>2/25/19</a:t>
+              <a:t>10/9/19</a:t>
             </a:fld>
             <a:endParaRPr lang="en-US"/>
           </a:p>
@@ -2355,7 +2356,7 @@
           <a:p>
             <a:fld id="{80999DC0-E190-4E92-A646-DF8A2FBFFF53}" type="datetimeFigureOut">
               <a:rPr lang="en-US" smtClean="0"/>
-              <a:t>2/25/19</a:t>
+              <a:t>10/9/19</a:t>
             </a:fld>
             <a:endParaRPr lang="en-US"/>
           </a:p>
@@ -2594,7 +2595,7 @@
           <a:p>
             <a:fld id="{80999DC0-E190-4E92-A646-DF8A2FBFFF53}" type="datetimeFigureOut">
               <a:rPr lang="en-US" smtClean="0"/>
-              <a:t>2/25/19</a:t>
+              <a:t>10/9/19</a:t>
             </a:fld>
             <a:endParaRPr lang="en-US"/>
           </a:p>
@@ -3048,7 +3049,7 @@
         </p:nvGrpSpPr>
         <p:grpSpPr>
           <a:xfrm>
-            <a:off x="-6290" y="0"/>
+            <a:off x="-6290" y="17930"/>
             <a:ext cx="9113873" cy="6858000"/>
             <a:chOff x="-6290" y="0"/>
             <a:chExt cx="9113873" cy="6858000"/>
@@ -10292,7 +10293,7 @@
             <p:nvPr/>
           </p:nvPicPr>
           <p:blipFill>
-            <a:blip r:embed="rId3">
+            <a:blip r:embed="rId3" cstate="print">
               <a:extLst>
                 <a:ext uri="{28A0092B-C50C-407E-A947-70E740481C1C}">
                   <a14:useLocalDpi xmlns:a14="http://schemas.microsoft.com/office/drawing/2010/main" val="0"/>
@@ -10328,7 +10329,7 @@
             <p:nvPr/>
           </p:nvPicPr>
           <p:blipFill>
-            <a:blip r:embed="rId4">
+            <a:blip r:embed="rId4" cstate="print">
               <a:extLst>
                 <a:ext uri="{28A0092B-C50C-407E-A947-70E740481C1C}">
                   <a14:useLocalDpi xmlns:a14="http://schemas.microsoft.com/office/drawing/2010/main" val="0"/>
@@ -10364,7 +10365,7 @@
             <p:nvPr/>
           </p:nvPicPr>
           <p:blipFill>
-            <a:blip r:embed="rId5">
+            <a:blip r:embed="rId5" cstate="print">
               <a:extLst>
                 <a:ext uri="{28A0092B-C50C-407E-A947-70E740481C1C}">
                   <a14:useLocalDpi xmlns:a14="http://schemas.microsoft.com/office/drawing/2010/main" val="0"/>
@@ -10400,7 +10401,7 @@
             <p:nvPr/>
           </p:nvPicPr>
           <p:blipFill>
-            <a:blip r:embed="rId6">
+            <a:blip r:embed="rId6" cstate="print">
               <a:extLst>
                 <a:ext uri="{28A0092B-C50C-407E-A947-70E740481C1C}">
                   <a14:useLocalDpi xmlns:a14="http://schemas.microsoft.com/office/drawing/2010/main" val="0"/>
@@ -10436,7 +10437,7 @@
             <p:nvPr/>
           </p:nvPicPr>
           <p:blipFill>
-            <a:blip r:embed="rId7">
+            <a:blip r:embed="rId7" cstate="print">
               <a:extLst>
                 <a:ext uri="{28A0092B-C50C-407E-A947-70E740481C1C}">
                   <a14:useLocalDpi xmlns:a14="http://schemas.microsoft.com/office/drawing/2010/main" val="0"/>
@@ -10477,36 +10478,9 @@
   <p:cSld>
     <p:bg>
       <p:bgPr>
-        <a:gradFill flip="none" rotWithShape="1">
-          <a:gsLst>
-            <a:gs pos="0">
-              <a:schemeClr val="accent3">
-                <a:lumMod val="5000"/>
-                <a:lumOff val="95000"/>
-              </a:schemeClr>
-            </a:gs>
-            <a:gs pos="74000">
-              <a:schemeClr val="accent3">
-                <a:lumMod val="45000"/>
-                <a:lumOff val="55000"/>
-              </a:schemeClr>
-            </a:gs>
-            <a:gs pos="83000">
-              <a:schemeClr val="accent3">
-                <a:lumMod val="45000"/>
-                <a:lumOff val="55000"/>
-              </a:schemeClr>
-            </a:gs>
-            <a:gs pos="100000">
-              <a:schemeClr val="accent3">
-                <a:lumMod val="30000"/>
-                <a:lumOff val="70000"/>
-              </a:schemeClr>
-            </a:gs>
-          </a:gsLst>
-          <a:lin ang="5400000" scaled="1"/>
-          <a:tileRect/>
-        </a:gradFill>
+        <a:solidFill>
+          <a:schemeClr val="bg1"/>
+        </a:solidFill>
         <a:effectLst/>
       </p:bgPr>
     </p:bg>
@@ -10524,98 +10498,12 @@
           <a:chExt cx="0" cy="0"/>
         </a:xfrm>
       </p:grpSpPr>
-      <p:sp>
-        <p:nvSpPr>
-          <p:cNvPr id="93" name="Rectangle 92"/>
-          <p:cNvSpPr/>
-          <p:nvPr/>
-        </p:nvSpPr>
-        <p:spPr>
-          <a:xfrm>
-            <a:off x="-6290" y="0"/>
-            <a:ext cx="700580" cy="6858000"/>
-          </a:xfrm>
-          <a:prstGeom prst="rect">
-            <a:avLst/>
-          </a:prstGeom>
-          <a:solidFill>
-            <a:schemeClr val="bg1">
-              <a:lumMod val="50000"/>
-            </a:schemeClr>
-          </a:solidFill>
-          <a:ln>
-            <a:noFill/>
-          </a:ln>
-        </p:spPr>
-        <p:style>
-          <a:lnRef idx="2">
-            <a:schemeClr val="accent1">
-              <a:shade val="50000"/>
-            </a:schemeClr>
-          </a:lnRef>
-          <a:fillRef idx="1">
-            <a:schemeClr val="accent1"/>
-          </a:fillRef>
-          <a:effectRef idx="0">
-            <a:schemeClr val="accent1"/>
-          </a:effectRef>
-          <a:fontRef idx="minor">
-            <a:schemeClr val="lt1"/>
-          </a:fontRef>
-        </p:style>
-        <p:txBody>
-          <a:bodyPr vert="vert" rtlCol="0" anchor="ctr"/>
-          <a:lstStyle/>
-          <a:p>
-            <a:pPr algn="ctr"/>
-            <a:r>
-              <a:rPr lang="en-US" b="1" dirty="0"/>
-              <a:t>Quality Improvement Ecosystem</a:t>
-            </a:r>
-          </a:p>
-        </p:txBody>
-      </p:sp>
-      <p:sp>
-        <p:nvSpPr>
-          <p:cNvPr id="21" name="TextBox 20">
+      <p:grpSp>
+        <p:nvGrpSpPr>
+          <p:cNvPr id="24" name="Group 23">
             <a:extLst>
               <a:ext uri="{FF2B5EF4-FFF2-40B4-BE49-F238E27FC236}">
-                <a16:creationId xmlns:a16="http://schemas.microsoft.com/office/drawing/2014/main" id="{6B29F2E4-C809-BC44-9DE8-76B962C95CC5}"/>
-              </a:ext>
-            </a:extLst>
-          </p:cNvPr>
-          <p:cNvSpPr txBox="1"/>
-          <p:nvPr/>
-        </p:nvSpPr>
-        <p:spPr>
-          <a:xfrm>
-            <a:off x="1640641" y="303731"/>
-            <a:ext cx="6240939" cy="646331"/>
-          </a:xfrm>
-          <a:prstGeom prst="rect">
-            <a:avLst/>
-          </a:prstGeom>
-          <a:noFill/>
-        </p:spPr>
-        <p:txBody>
-          <a:bodyPr wrap="none" rtlCol="0">
-            <a:spAutoFit/>
-          </a:bodyPr>
-          <a:lstStyle/>
-          <a:p>
-            <a:r>
-              <a:rPr lang="en-US" sz="3600" dirty="0"/>
-              <a:t>Quality Improvement Ecosystem</a:t>
-            </a:r>
-          </a:p>
-        </p:txBody>
-      </p:sp>
-      <p:grpSp>
-        <p:nvGrpSpPr>
-          <p:cNvPr id="31" name="Group 30">
-            <a:extLst>
-              <a:ext uri="{FF2B5EF4-FFF2-40B4-BE49-F238E27FC236}">
-                <a16:creationId xmlns:a16="http://schemas.microsoft.com/office/drawing/2014/main" id="{38358F8F-16F5-A746-A275-99A46EB4625E}"/>
+                <a16:creationId xmlns:a16="http://schemas.microsoft.com/office/drawing/2014/main" id="{6EB00EFF-26A0-4624-8F88-905F25B7F098}"/>
               </a:ext>
             </a:extLst>
           </p:cNvPr>
@@ -10624,135 +10512,53 @@
         </p:nvGrpSpPr>
         <p:grpSpPr>
           <a:xfrm>
-            <a:off x="898793" y="1201995"/>
-            <a:ext cx="8248420" cy="5440239"/>
-            <a:chOff x="898793" y="1201995"/>
-            <a:chExt cx="8248420" cy="5440239"/>
+            <a:off x="636900" y="303731"/>
+            <a:ext cx="8647191" cy="6278218"/>
+            <a:chOff x="636900" y="303731"/>
+            <a:chExt cx="8647191" cy="6278218"/>
           </a:xfrm>
         </p:grpSpPr>
-        <p:grpSp>
-          <p:nvGrpSpPr>
-            <p:cNvPr id="90" name="Group 89"/>
-            <p:cNvGrpSpPr/>
-            <p:nvPr/>
-          </p:nvGrpSpPr>
-          <p:grpSpPr>
-            <a:xfrm>
-              <a:off x="898793" y="2237070"/>
-              <a:ext cx="2169322" cy="1326867"/>
-              <a:chOff x="1980612" y="4952"/>
-              <a:chExt cx="2428055" cy="1875401"/>
-            </a:xfrm>
-          </p:grpSpPr>
-          <p:sp>
-            <p:nvSpPr>
-              <p:cNvPr id="91" name="TextBox 90"/>
-              <p:cNvSpPr txBox="1"/>
-              <p:nvPr/>
-            </p:nvSpPr>
-            <p:spPr>
-              <a:xfrm>
-                <a:off x="1980612" y="4952"/>
-                <a:ext cx="2428055" cy="1305039"/>
-              </a:xfrm>
-              <a:prstGeom prst="rect">
-                <a:avLst/>
-              </a:prstGeom>
-              <a:noFill/>
-            </p:spPr>
-            <p:txBody>
-              <a:bodyPr wrap="square" rtlCol="0">
-                <a:spAutoFit/>
-              </a:bodyPr>
-              <a:lstStyle/>
-              <a:p>
-                <a:pPr algn="ctr"/>
-                <a:r>
-                  <a:rPr lang="en-US" b="1" dirty="0"/>
-                  <a:t>RESEARCH, PAYER &amp; PUBLIC HEALTH SURVEILLANCE</a:t>
-                </a:r>
-              </a:p>
-            </p:txBody>
-          </p:sp>
-          <p:sp>
-            <p:nvSpPr>
-              <p:cNvPr id="92" name="TextBox 91"/>
-              <p:cNvSpPr txBox="1"/>
-              <p:nvPr/>
-            </p:nvSpPr>
-            <p:spPr>
-              <a:xfrm>
-                <a:off x="2196381" y="1162582"/>
-                <a:ext cx="1930542" cy="717771"/>
-              </a:xfrm>
-              <a:prstGeom prst="rect">
-                <a:avLst/>
-              </a:prstGeom>
-              <a:noFill/>
-            </p:spPr>
-            <p:txBody>
-              <a:bodyPr wrap="square" rtlCol="0">
-                <a:spAutoFit/>
-              </a:bodyPr>
-              <a:lstStyle/>
-              <a:p>
-                <a:pPr algn="ctr"/>
-                <a:r>
-                  <a:rPr lang="en-US" sz="1350" dirty="0">
-                    <a:solidFill>
-                      <a:schemeClr val="accent4">
-                        <a:lumMod val="75000"/>
-                      </a:schemeClr>
-                    </a:solidFill>
-                  </a:rPr>
-                  <a:t>What is ACTUALLY happening and why?  </a:t>
-                </a:r>
-              </a:p>
-            </p:txBody>
-          </p:sp>
-        </p:grpSp>
-        <p:pic>
-          <p:nvPicPr>
-            <p:cNvPr id="4" name="Picture 3">
+        <p:sp>
+          <p:nvSpPr>
+            <p:cNvPr id="21" name="TextBox 20">
               <a:extLst>
                 <a:ext uri="{FF2B5EF4-FFF2-40B4-BE49-F238E27FC236}">
-                  <a16:creationId xmlns:a16="http://schemas.microsoft.com/office/drawing/2014/main" id="{0861EAE8-17EF-5145-9D9F-2A34F96CA5C2}"/>
+                  <a16:creationId xmlns:a16="http://schemas.microsoft.com/office/drawing/2014/main" id="{6B29F2E4-C809-BC44-9DE8-76B962C95CC5}"/>
                 </a:ext>
               </a:extLst>
             </p:cNvPr>
-            <p:cNvPicPr>
-              <a:picLocks noChangeAspect="1"/>
-            </p:cNvPicPr>
+            <p:cNvSpPr txBox="1"/>
             <p:nvPr/>
-          </p:nvPicPr>
-          <p:blipFill>
-            <a:blip r:embed="rId2">
-              <a:extLst>
-                <a:ext uri="{28A0092B-C50C-407E-A947-70E740481C1C}">
-                  <a14:useLocalDpi xmlns:a14="http://schemas.microsoft.com/office/drawing/2010/main" val="0"/>
-                </a:ext>
-              </a:extLst>
-            </a:blip>
-            <a:stretch>
-              <a:fillRect/>
-            </a:stretch>
-          </p:blipFill>
+          </p:nvSpPr>
           <p:spPr>
             <a:xfrm>
-              <a:off x="1566517" y="1201995"/>
-              <a:ext cx="700580" cy="1218401"/>
+              <a:off x="1640641" y="303731"/>
+              <a:ext cx="6240939" cy="646331"/>
             </a:xfrm>
             <a:prstGeom prst="rect">
               <a:avLst/>
             </a:prstGeom>
+            <a:noFill/>
           </p:spPr>
-        </p:pic>
+          <p:txBody>
+            <a:bodyPr wrap="none" rtlCol="0">
+              <a:spAutoFit/>
+            </a:bodyPr>
+            <a:lstStyle/>
+            <a:p>
+              <a:r>
+                <a:rPr lang="en-US" sz="3600" dirty="0"/>
+                <a:t>Quality Improvement Ecosystem</a:t>
+              </a:r>
+            </a:p>
+          </p:txBody>
+        </p:sp>
         <p:grpSp>
           <p:nvGrpSpPr>
-            <p:cNvPr id="13" name="Group 12">
+            <p:cNvPr id="31" name="Group 30">
               <a:extLst>
                 <a:ext uri="{FF2B5EF4-FFF2-40B4-BE49-F238E27FC236}">
-                  <a16:creationId xmlns:a16="http://schemas.microsoft.com/office/drawing/2014/main" id="{7558F974-CC37-2845-93D7-A5F033F86FF4}"/>
+                  <a16:creationId xmlns:a16="http://schemas.microsoft.com/office/drawing/2014/main" id="{38358F8F-16F5-A746-A275-99A46EB4625E}"/>
                 </a:ext>
               </a:extLst>
             </p:cNvPr>
@@ -10761,36 +10567,36 @@
           </p:nvGrpSpPr>
           <p:grpSpPr>
             <a:xfrm>
-              <a:off x="3167299" y="1300572"/>
-              <a:ext cx="2989011" cy="2133286"/>
-              <a:chOff x="3621472" y="1590333"/>
-              <a:chExt cx="2989011" cy="2133286"/>
+              <a:off x="636900" y="1405908"/>
+              <a:ext cx="7056337" cy="5176041"/>
+              <a:chOff x="898793" y="1396943"/>
+              <a:chExt cx="7056337" cy="5176041"/>
             </a:xfrm>
           </p:grpSpPr>
           <p:grpSp>
             <p:nvGrpSpPr>
-              <p:cNvPr id="78" name="Group 77"/>
+              <p:cNvPr id="90" name="Group 89"/>
               <p:cNvGrpSpPr/>
               <p:nvPr/>
             </p:nvGrpSpPr>
             <p:grpSpPr>
               <a:xfrm>
-                <a:off x="3621472" y="2570358"/>
-                <a:ext cx="2989011" cy="1153261"/>
-                <a:chOff x="2090670" y="840708"/>
-                <a:chExt cx="4007772" cy="1537681"/>
+                <a:off x="898793" y="2237070"/>
+                <a:ext cx="2169322" cy="1226911"/>
+                <a:chOff x="1980612" y="4952"/>
+                <a:chExt cx="2428055" cy="1734124"/>
               </a:xfrm>
             </p:grpSpPr>
             <p:sp>
               <p:nvSpPr>
-                <p:cNvPr id="79" name="TextBox 78"/>
+                <p:cNvPr id="91" name="TextBox 90"/>
                 <p:cNvSpPr txBox="1"/>
                 <p:nvPr/>
               </p:nvSpPr>
               <p:spPr>
                 <a:xfrm>
-                  <a:off x="2090670" y="840708"/>
-                  <a:ext cx="4007772" cy="820737"/>
+                  <a:off x="1980612" y="4952"/>
+                  <a:ext cx="2428055" cy="1174536"/>
                 </a:xfrm>
                 <a:prstGeom prst="rect">
                   <a:avLst/>
@@ -10805,29 +10611,22 @@
                 <a:p>
                   <a:pPr algn="ctr"/>
                   <a:r>
-                    <a:rPr lang="en-US" b="1" dirty="0"/>
-                    <a:t>GUIDELINES </a:t>
-                  </a:r>
-                </a:p>
-                <a:p>
-                  <a:pPr algn="ctr"/>
-                  <a:r>
                     <a:rPr lang="en-US" sz="1600" b="1" dirty="0"/>
-                    <a:t>(Professional Societies, CDC, etc.)</a:t>
+                    <a:t>1. RESEARCH, PAYER &amp; PUBLIC HEALTH SURVEILLANCE</a:t>
                   </a:r>
                 </a:p>
               </p:txBody>
             </p:sp>
             <p:sp>
               <p:nvSpPr>
-                <p:cNvPr id="80" name="TextBox 79"/>
+                <p:cNvPr id="92" name="TextBox 91"/>
                 <p:cNvSpPr txBox="1"/>
                 <p:nvPr/>
               </p:nvSpPr>
               <p:spPr>
                 <a:xfrm>
-                  <a:off x="2410781" y="1701281"/>
-                  <a:ext cx="3536605" cy="677108"/>
+                  <a:off x="2196381" y="1086556"/>
+                  <a:ext cx="1930542" cy="652520"/>
                 </a:xfrm>
                 <a:prstGeom prst="rect">
                   <a:avLst/>
@@ -10842,14 +10641,14 @@
                 <a:p>
                   <a:pPr algn="ctr"/>
                   <a:r>
-                    <a:rPr lang="en-US" sz="1350" dirty="0">
+                    <a:rPr lang="en-US" sz="1200" dirty="0">
                       <a:solidFill>
                         <a:schemeClr val="accent4">
                           <a:lumMod val="75000"/>
                         </a:schemeClr>
                       </a:solidFill>
                     </a:rPr>
-                    <a:t>What SHOULD happen. What do we want to happen? </a:t>
+                    <a:t>What is ACTUALLY happening and why?  </a:t>
                   </a:r>
                 </a:p>
               </p:txBody>
@@ -10857,10 +10656,10 @@
           </p:grpSp>
           <p:pic>
             <p:nvPicPr>
-              <p:cNvPr id="6" name="Picture 5">
+              <p:cNvPr id="4" name="Picture 3">
                 <a:extLst>
                   <a:ext uri="{FF2B5EF4-FFF2-40B4-BE49-F238E27FC236}">
-                    <a16:creationId xmlns:a16="http://schemas.microsoft.com/office/drawing/2014/main" id="{7F359850-8A7B-464B-88A6-9095AE7B92C3}"/>
+                    <a16:creationId xmlns:a16="http://schemas.microsoft.com/office/drawing/2014/main" id="{0861EAE8-17EF-5145-9D9F-2A34F96CA5C2}"/>
                   </a:ext>
                 </a:extLst>
               </p:cNvPr>
@@ -10870,7 +10669,7 @@
               <p:nvPr/>
             </p:nvPicPr>
             <p:blipFill>
-              <a:blip r:embed="rId3">
+              <a:blip r:embed="rId2" cstate="print">
                 <a:extLst>
                   <a:ext uri="{28A0092B-C50C-407E-A947-70E740481C1C}">
                     <a14:useLocalDpi xmlns:a14="http://schemas.microsoft.com/office/drawing/2010/main" val="0"/>
@@ -10883,59 +10682,871 @@
             </p:blipFill>
             <p:spPr>
               <a:xfrm>
-                <a:off x="4214265" y="1590333"/>
-                <a:ext cx="1602532" cy="901423"/>
+                <a:off x="1678611" y="1396943"/>
+                <a:ext cx="588485" cy="1023453"/>
               </a:xfrm>
               <a:prstGeom prst="rect">
                 <a:avLst/>
               </a:prstGeom>
             </p:spPr>
           </p:pic>
-        </p:grpSp>
-        <p:grpSp>
-          <p:nvGrpSpPr>
-            <p:cNvPr id="11" name="Group 10">
-              <a:extLst>
-                <a:ext uri="{FF2B5EF4-FFF2-40B4-BE49-F238E27FC236}">
-                  <a16:creationId xmlns:a16="http://schemas.microsoft.com/office/drawing/2014/main" id="{0E7C49AF-3539-8B42-8343-AB66073345B2}"/>
-                </a:ext>
-              </a:extLst>
-            </p:cNvPr>
-            <p:cNvGrpSpPr/>
-            <p:nvPr/>
-          </p:nvGrpSpPr>
-          <p:grpSpPr>
-            <a:xfrm>
-              <a:off x="2066578" y="5074772"/>
-              <a:ext cx="2544997" cy="1227437"/>
-              <a:chOff x="483766" y="5082844"/>
-              <a:chExt cx="2544997" cy="1227437"/>
-            </a:xfrm>
-          </p:grpSpPr>
           <p:grpSp>
             <p:nvGrpSpPr>
-              <p:cNvPr id="87" name="Group 86"/>
+              <p:cNvPr id="13" name="Group 12">
+                <a:extLst>
+                  <a:ext uri="{FF2B5EF4-FFF2-40B4-BE49-F238E27FC236}">
+                    <a16:creationId xmlns:a16="http://schemas.microsoft.com/office/drawing/2014/main" id="{7558F974-CC37-2845-93D7-A5F033F86FF4}"/>
+                  </a:ext>
+                </a:extLst>
+              </p:cNvPr>
               <p:cNvGrpSpPr/>
               <p:nvPr/>
             </p:nvGrpSpPr>
             <p:grpSpPr>
               <a:xfrm>
-                <a:off x="1428572" y="5082844"/>
-                <a:ext cx="1600191" cy="1086920"/>
-                <a:chOff x="972457" y="867060"/>
-                <a:chExt cx="2789032" cy="1440944"/>
+                <a:off x="3262599" y="1417395"/>
+                <a:ext cx="2124267" cy="1826863"/>
+                <a:chOff x="3716772" y="1707156"/>
+                <a:chExt cx="2124267" cy="1826863"/>
+              </a:xfrm>
+            </p:grpSpPr>
+            <p:grpSp>
+              <p:nvGrpSpPr>
+                <p:cNvPr id="78" name="Group 77"/>
+                <p:cNvGrpSpPr/>
+                <p:nvPr/>
+              </p:nvGrpSpPr>
+              <p:grpSpPr>
+                <a:xfrm>
+                  <a:off x="3716772" y="2390108"/>
+                  <a:ext cx="2124267" cy="1143911"/>
+                  <a:chOff x="2218445" y="600375"/>
+                  <a:chExt cx="2848292" cy="1525214"/>
+                </a:xfrm>
+              </p:grpSpPr>
+              <p:sp>
+                <p:nvSpPr>
+                  <p:cNvPr id="79" name="TextBox 78"/>
+                  <p:cNvSpPr txBox="1"/>
+                  <p:nvPr/>
+                </p:nvSpPr>
+                <p:spPr>
+                  <a:xfrm>
+                    <a:off x="2275662" y="600375"/>
+                    <a:ext cx="2791075" cy="1025921"/>
+                  </a:xfrm>
+                  <a:prstGeom prst="rect">
+                    <a:avLst/>
+                  </a:prstGeom>
+                  <a:noFill/>
+                </p:spPr>
+                <p:txBody>
+                  <a:bodyPr wrap="square" rtlCol="0">
+                    <a:spAutoFit/>
+                  </a:bodyPr>
+                  <a:lstStyle/>
+                  <a:p>
+                    <a:pPr algn="ctr"/>
+                    <a:r>
+                      <a:rPr lang="en-US" sz="1600" b="1" dirty="0"/>
+                      <a:t>2. GUIDELINES </a:t>
+                    </a:r>
+                  </a:p>
+                  <a:p>
+                    <a:pPr algn="ctr"/>
+                    <a:r>
+                      <a:rPr lang="en-US" sz="1400" b="1" dirty="0"/>
+                      <a:t>(Professional Societies, CDC, etc.)</a:t>
+                    </a:r>
+                  </a:p>
+                </p:txBody>
+              </p:sp>
+              <p:sp>
+                <p:nvSpPr>
+                  <p:cNvPr id="80" name="TextBox 79"/>
+                  <p:cNvSpPr txBox="1"/>
+                  <p:nvPr/>
+                </p:nvSpPr>
+                <p:spPr>
+                  <a:xfrm>
+                    <a:off x="2218445" y="1510036"/>
+                    <a:ext cx="2791076" cy="615553"/>
+                  </a:xfrm>
+                  <a:prstGeom prst="rect">
+                    <a:avLst/>
+                  </a:prstGeom>
+                  <a:noFill/>
+                </p:spPr>
+                <p:txBody>
+                  <a:bodyPr wrap="square" rtlCol="0">
+                    <a:spAutoFit/>
+                  </a:bodyPr>
+                  <a:lstStyle/>
+                  <a:p>
+                    <a:pPr algn="ctr"/>
+                    <a:r>
+                      <a:rPr lang="en-US" sz="1200" dirty="0">
+                        <a:solidFill>
+                          <a:schemeClr val="accent4">
+                            <a:lumMod val="75000"/>
+                          </a:schemeClr>
+                        </a:solidFill>
+                      </a:rPr>
+                      <a:t>What SHOULD happen. What do we want to happen? </a:t>
+                    </a:r>
+                  </a:p>
+                </p:txBody>
+              </p:sp>
+            </p:grpSp>
+            <p:pic>
+              <p:nvPicPr>
+                <p:cNvPr id="6" name="Picture 5">
+                  <a:extLst>
+                    <a:ext uri="{FF2B5EF4-FFF2-40B4-BE49-F238E27FC236}">
+                      <a16:creationId xmlns:a16="http://schemas.microsoft.com/office/drawing/2014/main" id="{7F359850-8A7B-464B-88A6-9095AE7B92C3}"/>
+                    </a:ext>
+                  </a:extLst>
+                </p:cNvPr>
+                <p:cNvPicPr>
+                  <a:picLocks noChangeAspect="1"/>
+                </p:cNvPicPr>
+                <p:nvPr/>
+              </p:nvPicPr>
+              <p:blipFill>
+                <a:blip r:embed="rId3" cstate="print">
+                  <a:extLst>
+                    <a:ext uri="{28A0092B-C50C-407E-A947-70E740481C1C}">
+                      <a14:useLocalDpi xmlns:a14="http://schemas.microsoft.com/office/drawing/2010/main" val="0"/>
+                    </a:ext>
+                  </a:extLst>
+                </a:blip>
+                <a:stretch>
+                  <a:fillRect/>
+                </a:stretch>
+              </p:blipFill>
+              <p:spPr>
+                <a:xfrm>
+                  <a:off x="4150015" y="1707156"/>
+                  <a:ext cx="1236766" cy="695680"/>
+                </a:xfrm>
+                <a:prstGeom prst="rect">
+                  <a:avLst/>
+                </a:prstGeom>
+              </p:spPr>
+            </p:pic>
+          </p:grpSp>
+          <p:grpSp>
+            <p:nvGrpSpPr>
+              <p:cNvPr id="11" name="Group 10">
+                <a:extLst>
+                  <a:ext uri="{FF2B5EF4-FFF2-40B4-BE49-F238E27FC236}">
+                    <a16:creationId xmlns:a16="http://schemas.microsoft.com/office/drawing/2014/main" id="{0E7C49AF-3539-8B42-8343-AB66073345B2}"/>
+                  </a:ext>
+                </a:extLst>
+              </p:cNvPr>
+              <p:cNvGrpSpPr/>
+              <p:nvPr/>
+            </p:nvGrpSpPr>
+            <p:grpSpPr>
+              <a:xfrm>
+                <a:off x="1909068" y="5047877"/>
+                <a:ext cx="2299090" cy="1017670"/>
+                <a:chOff x="326256" y="5055949"/>
+                <a:chExt cx="2299090" cy="1017670"/>
+              </a:xfrm>
+            </p:grpSpPr>
+            <p:grpSp>
+              <p:nvGrpSpPr>
+                <p:cNvPr id="87" name="Group 86"/>
+                <p:cNvGrpSpPr/>
+                <p:nvPr/>
+              </p:nvGrpSpPr>
+              <p:grpSpPr>
+                <a:xfrm>
+                  <a:off x="1025155" y="5055949"/>
+                  <a:ext cx="1600191" cy="1017670"/>
+                  <a:chOff x="269332" y="831405"/>
+                  <a:chExt cx="2789031" cy="1349138"/>
+                </a:xfrm>
+              </p:grpSpPr>
+              <p:sp>
+                <p:nvSpPr>
+                  <p:cNvPr id="88" name="TextBox 87"/>
+                  <p:cNvSpPr txBox="1"/>
+                  <p:nvPr/>
+                </p:nvSpPr>
+                <p:spPr>
+                  <a:xfrm>
+                    <a:off x="269332" y="831405"/>
+                    <a:ext cx="2705381" cy="448825"/>
+                  </a:xfrm>
+                  <a:prstGeom prst="rect">
+                    <a:avLst/>
+                  </a:prstGeom>
+                  <a:noFill/>
+                </p:spPr>
+                <p:txBody>
+                  <a:bodyPr wrap="square" rtlCol="0">
+                    <a:spAutoFit/>
+                  </a:bodyPr>
+                  <a:lstStyle/>
+                  <a:p>
+                    <a:pPr algn="r"/>
+                    <a:r>
+                      <a:rPr lang="en-US" sz="1600" b="1" dirty="0"/>
+                      <a:t>6. REPORTING</a:t>
+                    </a:r>
+                  </a:p>
+                </p:txBody>
+              </p:sp>
+              <p:sp>
+                <p:nvSpPr>
+                  <p:cNvPr id="89" name="TextBox 88"/>
+                  <p:cNvSpPr txBox="1"/>
+                  <p:nvPr/>
+                </p:nvSpPr>
+                <p:spPr>
+                  <a:xfrm>
+                    <a:off x="826815" y="1323694"/>
+                    <a:ext cx="2231548" cy="856849"/>
+                  </a:xfrm>
+                  <a:prstGeom prst="rect">
+                    <a:avLst/>
+                  </a:prstGeom>
+                  <a:noFill/>
+                </p:spPr>
+                <p:txBody>
+                  <a:bodyPr wrap="square" rtlCol="0">
+                    <a:spAutoFit/>
+                  </a:bodyPr>
+                  <a:lstStyle/>
+                  <a:p>
+                    <a:pPr marL="114300" indent="-114300">
+                      <a:buFont typeface="Arial" panose="020B0604020202020204" pitchFamily="34" charset="0"/>
+                      <a:buChar char="•"/>
+                    </a:pPr>
+                    <a:r>
+                      <a:rPr lang="en-US" sz="1200" dirty="0">
+                        <a:solidFill>
+                          <a:schemeClr val="accent4">
+                            <a:lumMod val="75000"/>
+                          </a:schemeClr>
+                        </a:solidFill>
+                      </a:rPr>
+                      <a:t>Public Health </a:t>
+                    </a:r>
+                  </a:p>
+                  <a:p>
+                    <a:pPr marL="114300" indent="-114300">
+                      <a:buFont typeface="Arial" panose="020B0604020202020204" pitchFamily="34" charset="0"/>
+                      <a:buChar char="•"/>
+                    </a:pPr>
+                    <a:r>
+                      <a:rPr lang="en-US" sz="1200" dirty="0">
+                        <a:solidFill>
+                          <a:schemeClr val="accent4">
+                            <a:lumMod val="75000"/>
+                          </a:schemeClr>
+                        </a:solidFill>
+                      </a:rPr>
+                      <a:t>Quality</a:t>
+                    </a:r>
+                  </a:p>
+                  <a:p>
+                    <a:pPr marL="114300" indent="-114300">
+                      <a:buFont typeface="Arial" panose="020B0604020202020204" pitchFamily="34" charset="0"/>
+                      <a:buChar char="•"/>
+                    </a:pPr>
+                    <a:r>
+                      <a:rPr lang="en-US" sz="1200" dirty="0">
+                        <a:solidFill>
+                          <a:schemeClr val="accent4">
+                            <a:lumMod val="75000"/>
+                          </a:schemeClr>
+                        </a:solidFill>
+                      </a:rPr>
+                      <a:t>Safety</a:t>
+                    </a:r>
+                  </a:p>
+                </p:txBody>
+              </p:sp>
+            </p:grpSp>
+            <p:pic>
+              <p:nvPicPr>
+                <p:cNvPr id="12" name="Picture 11">
+                  <a:extLst>
+                    <a:ext uri="{FF2B5EF4-FFF2-40B4-BE49-F238E27FC236}">
+                      <a16:creationId xmlns:a16="http://schemas.microsoft.com/office/drawing/2014/main" id="{4C55C224-0606-BE45-9634-AA28D6ED96FF}"/>
+                    </a:ext>
+                  </a:extLst>
+                </p:cNvPr>
+                <p:cNvPicPr>
+                  <a:picLocks noChangeAspect="1"/>
+                </p:cNvPicPr>
+                <p:nvPr/>
+              </p:nvPicPr>
+              <p:blipFill>
+                <a:blip r:embed="rId4" cstate="print">
+                  <a:extLst>
+                    <a:ext uri="{28A0092B-C50C-407E-A947-70E740481C1C}">
+                      <a14:useLocalDpi xmlns:a14="http://schemas.microsoft.com/office/drawing/2010/main" val="0"/>
+                    </a:ext>
+                  </a:extLst>
+                </a:blip>
+                <a:stretch>
+                  <a:fillRect/>
+                </a:stretch>
+              </p:blipFill>
+              <p:spPr>
+                <a:xfrm>
+                  <a:off x="326256" y="5091348"/>
+                  <a:ext cx="1159047" cy="977946"/>
+                </a:xfrm>
+                <a:prstGeom prst="rect">
+                  <a:avLst/>
+                </a:prstGeom>
+                <a:noFill/>
+              </p:spPr>
+            </p:pic>
+          </p:grpSp>
+          <p:grpSp>
+            <p:nvGrpSpPr>
+              <p:cNvPr id="7" name="Group 6">
+                <a:extLst>
+                  <a:ext uri="{FF2B5EF4-FFF2-40B4-BE49-F238E27FC236}">
+                    <a16:creationId xmlns:a16="http://schemas.microsoft.com/office/drawing/2014/main" id="{AF9B53AA-7153-0F49-B6CD-A55E887F2C34}"/>
+                  </a:ext>
+                </a:extLst>
+              </p:cNvPr>
+              <p:cNvGrpSpPr/>
+              <p:nvPr/>
+            </p:nvGrpSpPr>
+            <p:grpSpPr>
+              <a:xfrm>
+                <a:off x="5875658" y="1534933"/>
+                <a:ext cx="2079472" cy="1416866"/>
+                <a:chOff x="5982855" y="1961295"/>
+                <a:chExt cx="2079472" cy="1416866"/>
+              </a:xfrm>
+            </p:grpSpPr>
+            <p:grpSp>
+              <p:nvGrpSpPr>
+                <p:cNvPr id="81" name="Group 80"/>
+                <p:cNvGrpSpPr/>
+                <p:nvPr/>
+              </p:nvGrpSpPr>
+              <p:grpSpPr>
+                <a:xfrm>
+                  <a:off x="6722846" y="1961295"/>
+                  <a:ext cx="1339481" cy="1416866"/>
+                  <a:chOff x="-103283" y="547239"/>
+                  <a:chExt cx="2287410" cy="1255781"/>
+                </a:xfrm>
+              </p:grpSpPr>
+              <p:sp>
+                <p:nvSpPr>
+                  <p:cNvPr id="82" name="TextBox 81"/>
+                  <p:cNvSpPr txBox="1"/>
+                  <p:nvPr/>
+                </p:nvSpPr>
+                <p:spPr>
+                  <a:xfrm>
+                    <a:off x="-103283" y="547239"/>
+                    <a:ext cx="2112004" cy="736520"/>
+                  </a:xfrm>
+                  <a:prstGeom prst="rect">
+                    <a:avLst/>
+                  </a:prstGeom>
+                  <a:noFill/>
+                </p:spPr>
+                <p:txBody>
+                  <a:bodyPr wrap="square" rtlCol="0">
+                    <a:spAutoFit/>
+                  </a:bodyPr>
+                  <a:lstStyle/>
+                  <a:p>
+                    <a:r>
+                      <a:rPr lang="en-US" sz="1600" b="1" dirty="0"/>
+                      <a:t>3. CLINICAL DECISION SUPPORT</a:t>
+                    </a:r>
+                  </a:p>
+                </p:txBody>
+              </p:sp>
+              <p:sp>
+                <p:nvSpPr>
+                  <p:cNvPr id="83" name="TextBox 82"/>
+                  <p:cNvSpPr txBox="1"/>
+                  <p:nvPr/>
+                </p:nvSpPr>
+                <p:spPr>
+                  <a:xfrm>
+                    <a:off x="-69775" y="1230171"/>
+                    <a:ext cx="2253902" cy="572849"/>
+                  </a:xfrm>
+                  <a:prstGeom prst="rect">
+                    <a:avLst/>
+                  </a:prstGeom>
+                  <a:noFill/>
+                </p:spPr>
+                <p:txBody>
+                  <a:bodyPr wrap="square" rtlCol="0">
+                    <a:spAutoFit/>
+                  </a:bodyPr>
+                  <a:lstStyle/>
+                  <a:p>
+                    <a:r>
+                      <a:rPr lang="en-US" sz="1200" dirty="0">
+                        <a:solidFill>
+                          <a:schemeClr val="accent4">
+                            <a:lumMod val="75000"/>
+                          </a:schemeClr>
+                        </a:solidFill>
+                      </a:rPr>
+                      <a:t>MAKING it happen within local workflow.</a:t>
+                    </a:r>
+                  </a:p>
+                </p:txBody>
+              </p:sp>
+            </p:grpSp>
+            <p:pic>
+              <p:nvPicPr>
+                <p:cNvPr id="8" name="Picture 7">
+                  <a:extLst>
+                    <a:ext uri="{FF2B5EF4-FFF2-40B4-BE49-F238E27FC236}">
+                      <a16:creationId xmlns:a16="http://schemas.microsoft.com/office/drawing/2014/main" id="{D80FE52C-775C-C84D-8228-FC0F53271C35}"/>
+                    </a:ext>
+                  </a:extLst>
+                </p:cNvPr>
+                <p:cNvPicPr>
+                  <a:picLocks noChangeAspect="1"/>
+                </p:cNvPicPr>
+                <p:nvPr/>
+              </p:nvPicPr>
+              <p:blipFill>
+                <a:blip r:embed="rId5" cstate="print">
+                  <a:extLst>
+                    <a:ext uri="{28A0092B-C50C-407E-A947-70E740481C1C}">
+                      <a14:useLocalDpi xmlns:a14="http://schemas.microsoft.com/office/drawing/2010/main" val="0"/>
+                    </a:ext>
+                  </a:extLst>
+                </a:blip>
+                <a:stretch>
+                  <a:fillRect/>
+                </a:stretch>
+              </p:blipFill>
+              <p:spPr>
+                <a:xfrm>
+                  <a:off x="5982855" y="2240907"/>
+                  <a:ext cx="931135" cy="921587"/>
+                </a:xfrm>
+                <a:prstGeom prst="rect">
+                  <a:avLst/>
+                </a:prstGeom>
+              </p:spPr>
+            </p:pic>
+          </p:grpSp>
+          <p:grpSp>
+            <p:nvGrpSpPr>
+              <p:cNvPr id="9" name="Group 8">
+                <a:extLst>
+                  <a:ext uri="{FF2B5EF4-FFF2-40B4-BE49-F238E27FC236}">
+                    <a16:creationId xmlns:a16="http://schemas.microsoft.com/office/drawing/2014/main" id="{E2463DC9-C19E-3F44-A3E3-0C9F286DFFBD}"/>
+                  </a:ext>
+                </a:extLst>
+              </p:cNvPr>
+              <p:cNvGrpSpPr/>
+              <p:nvPr/>
+            </p:nvGrpSpPr>
+            <p:grpSpPr>
+              <a:xfrm>
+                <a:off x="5273789" y="4791466"/>
+                <a:ext cx="2260806" cy="1781518"/>
+                <a:chOff x="4936614" y="4022628"/>
+                <a:chExt cx="2260806" cy="1781518"/>
+              </a:xfrm>
+            </p:grpSpPr>
+            <p:grpSp>
+              <p:nvGrpSpPr>
+                <p:cNvPr id="84" name="Group 83"/>
+                <p:cNvGrpSpPr/>
+                <p:nvPr/>
+              </p:nvGrpSpPr>
+              <p:grpSpPr>
+                <a:xfrm>
+                  <a:off x="4936614" y="4592873"/>
+                  <a:ext cx="2260806" cy="1211273"/>
+                  <a:chOff x="-1360210" y="867060"/>
+                  <a:chExt cx="3795312" cy="1615029"/>
+                </a:xfrm>
+              </p:grpSpPr>
+              <p:sp>
+                <p:nvSpPr>
+                  <p:cNvPr id="85" name="TextBox 84"/>
+                  <p:cNvSpPr txBox="1"/>
+                  <p:nvPr/>
+                </p:nvSpPr>
+                <p:spPr>
+                  <a:xfrm>
+                    <a:off x="-1360210" y="867060"/>
+                    <a:ext cx="3795312" cy="779699"/>
+                  </a:xfrm>
+                  <a:prstGeom prst="rect">
+                    <a:avLst/>
+                  </a:prstGeom>
+                  <a:noFill/>
+                </p:spPr>
+                <p:txBody>
+                  <a:bodyPr wrap="square" rtlCol="0">
+                    <a:spAutoFit/>
+                  </a:bodyPr>
+                  <a:lstStyle/>
+                  <a:p>
+                    <a:r>
+                      <a:rPr lang="en-US" sz="1600" b="1" dirty="0"/>
+                      <a:t>5. MEASUREMENT ANALYTICS</a:t>
+                    </a:r>
+                  </a:p>
+                </p:txBody>
+              </p:sp>
+              <p:sp>
+                <p:nvSpPr>
+                  <p:cNvPr id="86" name="TextBox 85"/>
+                  <p:cNvSpPr txBox="1"/>
+                  <p:nvPr/>
+                </p:nvSpPr>
+                <p:spPr>
+                  <a:xfrm>
+                    <a:off x="-1360210" y="1620315"/>
+                    <a:ext cx="3296625" cy="861774"/>
+                  </a:xfrm>
+                  <a:prstGeom prst="rect">
+                    <a:avLst/>
+                  </a:prstGeom>
+                  <a:noFill/>
+                </p:spPr>
+                <p:txBody>
+                  <a:bodyPr wrap="square" rtlCol="0">
+                    <a:spAutoFit/>
+                  </a:bodyPr>
+                  <a:lstStyle/>
+                  <a:p>
+                    <a:r>
+                      <a:rPr lang="en-US" sz="1200" dirty="0">
+                        <a:solidFill>
+                          <a:schemeClr val="accent4">
+                            <a:lumMod val="75000"/>
+                          </a:schemeClr>
+                        </a:solidFill>
+                      </a:rPr>
+                      <a:t>What DID happen? What processes and outcomes have been achieved? </a:t>
+                    </a:r>
+                  </a:p>
+                </p:txBody>
+              </p:sp>
+            </p:grpSp>
+            <p:pic>
+              <p:nvPicPr>
+                <p:cNvPr id="10" name="Picture 9">
+                  <a:extLst>
+                    <a:ext uri="{FF2B5EF4-FFF2-40B4-BE49-F238E27FC236}">
+                      <a16:creationId xmlns:a16="http://schemas.microsoft.com/office/drawing/2014/main" id="{D1031565-17EA-5742-8E2C-1558F08FF0DD}"/>
+                    </a:ext>
+                  </a:extLst>
+                </p:cNvPr>
+                <p:cNvPicPr>
+                  <a:picLocks noChangeAspect="1"/>
+                </p:cNvPicPr>
+                <p:nvPr/>
+              </p:nvPicPr>
+              <p:blipFill>
+                <a:blip r:embed="rId6" cstate="print">
+                  <a:extLst>
+                    <a:ext uri="{28A0092B-C50C-407E-A947-70E740481C1C}">
+                      <a14:useLocalDpi xmlns:a14="http://schemas.microsoft.com/office/drawing/2010/main" val="0"/>
+                    </a:ext>
+                  </a:extLst>
+                </a:blip>
+                <a:stretch>
+                  <a:fillRect/>
+                </a:stretch>
+              </p:blipFill>
+              <p:spPr>
+                <a:xfrm>
+                  <a:off x="5235002" y="4022628"/>
+                  <a:ext cx="921529" cy="633552"/>
+                </a:xfrm>
+                <a:prstGeom prst="rect">
+                  <a:avLst/>
+                </a:prstGeom>
+              </p:spPr>
+            </p:pic>
+          </p:grpSp>
+          <p:cxnSp>
+            <p:nvCxnSpPr>
+              <p:cNvPr id="15" name="Straight Arrow Connector 14">
+                <a:extLst>
+                  <a:ext uri="{FF2B5EF4-FFF2-40B4-BE49-F238E27FC236}">
+                    <a16:creationId xmlns:a16="http://schemas.microsoft.com/office/drawing/2014/main" id="{1B43913B-C38A-D149-9826-4673CB7D77FF}"/>
+                  </a:ext>
+                </a:extLst>
+              </p:cNvPr>
+              <p:cNvCxnSpPr>
+                <a:cxnSpLocks/>
+              </p:cNvCxnSpPr>
+              <p:nvPr/>
+            </p:nvCxnSpPr>
+            <p:spPr>
+              <a:xfrm>
+                <a:off x="2585545" y="1781223"/>
+                <a:ext cx="945223" cy="0"/>
+              </a:xfrm>
+              <a:prstGeom prst="straightConnector1">
+                <a:avLst/>
+              </a:prstGeom>
+              <a:ln w="79375">
+                <a:solidFill>
+                  <a:schemeClr val="bg2">
+                    <a:lumMod val="50000"/>
+                  </a:schemeClr>
+                </a:solidFill>
+                <a:tailEnd type="triangle"/>
+              </a:ln>
+            </p:spPr>
+            <p:style>
+              <a:lnRef idx="1">
+                <a:schemeClr val="accent1"/>
+              </a:lnRef>
+              <a:fillRef idx="0">
+                <a:schemeClr val="accent1"/>
+              </a:fillRef>
+              <a:effectRef idx="0">
+                <a:schemeClr val="accent1"/>
+              </a:effectRef>
+              <a:fontRef idx="minor">
+                <a:schemeClr val="tx1"/>
+              </a:fontRef>
+            </p:style>
+          </p:cxnSp>
+          <p:cxnSp>
+            <p:nvCxnSpPr>
+              <p:cNvPr id="54" name="Straight Arrow Connector 53">
+                <a:extLst>
+                  <a:ext uri="{FF2B5EF4-FFF2-40B4-BE49-F238E27FC236}">
+                    <a16:creationId xmlns:a16="http://schemas.microsoft.com/office/drawing/2014/main" id="{1600A01D-F136-624F-A54F-BAE4E59C344B}"/>
+                  </a:ext>
+                </a:extLst>
+              </p:cNvPr>
+              <p:cNvCxnSpPr/>
+              <p:nvPr/>
+            </p:nvCxnSpPr>
+            <p:spPr>
+              <a:xfrm>
+                <a:off x="5246081" y="1781223"/>
+                <a:ext cx="713996" cy="0"/>
+              </a:xfrm>
+              <a:prstGeom prst="straightConnector1">
+                <a:avLst/>
+              </a:prstGeom>
+              <a:ln w="79375">
+                <a:solidFill>
+                  <a:schemeClr val="bg2">
+                    <a:lumMod val="50000"/>
+                  </a:schemeClr>
+                </a:solidFill>
+                <a:tailEnd type="triangle"/>
+              </a:ln>
+            </p:spPr>
+            <p:style>
+              <a:lnRef idx="1">
+                <a:schemeClr val="accent1"/>
+              </a:lnRef>
+              <a:fillRef idx="0">
+                <a:schemeClr val="accent1"/>
+              </a:fillRef>
+              <a:effectRef idx="0">
+                <a:schemeClr val="accent1"/>
+              </a:effectRef>
+              <a:fontRef idx="minor">
+                <a:schemeClr val="tx1"/>
+              </a:fontRef>
+            </p:style>
+          </p:cxnSp>
+          <p:cxnSp>
+            <p:nvCxnSpPr>
+              <p:cNvPr id="55" name="Straight Arrow Connector 54">
+                <a:extLst>
+                  <a:ext uri="{FF2B5EF4-FFF2-40B4-BE49-F238E27FC236}">
+                    <a16:creationId xmlns:a16="http://schemas.microsoft.com/office/drawing/2014/main" id="{EBFD61F8-1179-C446-B4E4-A91E6A39733E}"/>
+                  </a:ext>
+                </a:extLst>
+              </p:cNvPr>
+              <p:cNvCxnSpPr>
+                <a:cxnSpLocks/>
+              </p:cNvCxnSpPr>
+              <p:nvPr/>
+            </p:nvCxnSpPr>
+            <p:spPr>
+              <a:xfrm>
+                <a:off x="6488969" y="3330310"/>
+                <a:ext cx="22825" cy="839617"/>
+              </a:xfrm>
+              <a:prstGeom prst="straightConnector1">
+                <a:avLst/>
+              </a:prstGeom>
+              <a:ln w="79375">
+                <a:solidFill>
+                  <a:schemeClr val="bg2">
+                    <a:lumMod val="50000"/>
+                  </a:schemeClr>
+                </a:solidFill>
+                <a:tailEnd type="triangle"/>
+              </a:ln>
+            </p:spPr>
+            <p:style>
+              <a:lnRef idx="1">
+                <a:schemeClr val="accent1"/>
+              </a:lnRef>
+              <a:fillRef idx="0">
+                <a:schemeClr val="accent1"/>
+              </a:fillRef>
+              <a:effectRef idx="0">
+                <a:schemeClr val="accent1"/>
+              </a:effectRef>
+              <a:fontRef idx="minor">
+                <a:schemeClr val="tx1"/>
+              </a:fontRef>
+            </p:style>
+          </p:cxnSp>
+          <p:cxnSp>
+            <p:nvCxnSpPr>
+              <p:cNvPr id="57" name="Straight Arrow Connector 56">
+                <a:extLst>
+                  <a:ext uri="{FF2B5EF4-FFF2-40B4-BE49-F238E27FC236}">
+                    <a16:creationId xmlns:a16="http://schemas.microsoft.com/office/drawing/2014/main" id="{52940CBA-9C0F-3B46-A29F-CDEB10EE50EB}"/>
+                  </a:ext>
+                </a:extLst>
+              </p:cNvPr>
+              <p:cNvCxnSpPr>
+                <a:cxnSpLocks/>
+              </p:cNvCxnSpPr>
+              <p:nvPr/>
+            </p:nvCxnSpPr>
+            <p:spPr>
+              <a:xfrm flipH="1">
+                <a:off x="4145403" y="5469759"/>
+                <a:ext cx="878337" cy="0"/>
+              </a:xfrm>
+              <a:prstGeom prst="straightConnector1">
+                <a:avLst/>
+              </a:prstGeom>
+              <a:ln w="79375">
+                <a:solidFill>
+                  <a:schemeClr val="bg2">
+                    <a:lumMod val="50000"/>
+                  </a:schemeClr>
+                </a:solidFill>
+                <a:tailEnd type="triangle"/>
+              </a:ln>
+            </p:spPr>
+            <p:style>
+              <a:lnRef idx="1">
+                <a:schemeClr val="accent1"/>
+              </a:lnRef>
+              <a:fillRef idx="0">
+                <a:schemeClr val="accent1"/>
+              </a:fillRef>
+              <a:effectRef idx="0">
+                <a:schemeClr val="accent1"/>
+              </a:effectRef>
+              <a:fontRef idx="minor">
+                <a:schemeClr val="tx1"/>
+              </a:fontRef>
+            </p:style>
+          </p:cxnSp>
+          <p:cxnSp>
+            <p:nvCxnSpPr>
+              <p:cNvPr id="19" name="Elbow Connector 18">
+                <a:extLst>
+                  <a:ext uri="{FF2B5EF4-FFF2-40B4-BE49-F238E27FC236}">
+                    <a16:creationId xmlns:a16="http://schemas.microsoft.com/office/drawing/2014/main" id="{191CB074-DD2B-5146-B8A1-FAAC124E56D9}"/>
+                  </a:ext>
+                </a:extLst>
+              </p:cNvPr>
+              <p:cNvCxnSpPr>
+                <a:cxnSpLocks/>
+              </p:cNvCxnSpPr>
+              <p:nvPr/>
+            </p:nvCxnSpPr>
+            <p:spPr>
+              <a:xfrm rot="16200000" flipV="1">
+                <a:off x="791853" y="4295968"/>
+                <a:ext cx="1911257" cy="400063"/>
+              </a:xfrm>
+              <a:prstGeom prst="bentConnector3">
+                <a:avLst>
+                  <a:gd name="adj1" fmla="val 1607"/>
+                </a:avLst>
+              </a:prstGeom>
+              <a:ln w="79375">
+                <a:solidFill>
+                  <a:schemeClr val="bg2">
+                    <a:lumMod val="50000"/>
+                  </a:schemeClr>
+                </a:solidFill>
+                <a:tailEnd type="triangle"/>
+              </a:ln>
+            </p:spPr>
+            <p:style>
+              <a:lnRef idx="1">
+                <a:schemeClr val="accent1"/>
+              </a:lnRef>
+              <a:fillRef idx="0">
+                <a:schemeClr val="accent1"/>
+              </a:fillRef>
+              <a:effectRef idx="0">
+                <a:schemeClr val="accent1"/>
+              </a:effectRef>
+              <a:fontRef idx="minor">
+                <a:schemeClr val="tx1"/>
+              </a:fontRef>
+            </p:style>
+          </p:cxnSp>
+          <p:grpSp>
+            <p:nvGrpSpPr>
+              <p:cNvPr id="30" name="Group 29">
+                <a:extLst>
+                  <a:ext uri="{FF2B5EF4-FFF2-40B4-BE49-F238E27FC236}">
+                    <a16:creationId xmlns:a16="http://schemas.microsoft.com/office/drawing/2014/main" id="{FB7EB641-3695-8A4C-8168-3059CE27A590}"/>
+                  </a:ext>
+                </a:extLst>
+              </p:cNvPr>
+              <p:cNvGrpSpPr/>
+              <p:nvPr/>
+            </p:nvGrpSpPr>
+            <p:grpSpPr>
+              <a:xfrm>
+                <a:off x="2595852" y="3754769"/>
+                <a:ext cx="3491483" cy="649320"/>
+                <a:chOff x="2564322" y="3786299"/>
+                <a:chExt cx="3491483" cy="649320"/>
               </a:xfrm>
             </p:grpSpPr>
             <p:sp>
               <p:nvSpPr>
-                <p:cNvPr id="88" name="TextBox 87"/>
+                <p:cNvPr id="2" name="TextBox 1">
+                  <a:extLst>
+                    <a:ext uri="{FF2B5EF4-FFF2-40B4-BE49-F238E27FC236}">
+                      <a16:creationId xmlns:a16="http://schemas.microsoft.com/office/drawing/2014/main" id="{3F17351A-ACC6-C64E-AB36-8DD4397BE8BC}"/>
+                    </a:ext>
+                  </a:extLst>
+                </p:cNvPr>
                 <p:cNvSpPr txBox="1"/>
                 <p:nvPr/>
               </p:nvSpPr>
               <p:spPr>
                 <a:xfrm>
-                  <a:off x="972457" y="867060"/>
-                  <a:ext cx="2705381" cy="492443"/>
+                  <a:off x="3343690" y="4001402"/>
+                  <a:ext cx="2712115" cy="200055"/>
                 </a:xfrm>
                 <a:prstGeom prst="rect">
                   <a:avLst/>
@@ -10943,503 +11554,168 @@
                 <a:noFill/>
               </p:spPr>
               <p:txBody>
-                <a:bodyPr wrap="square" rtlCol="0">
-                  <a:spAutoFit/>
-                </a:bodyPr>
-                <a:lstStyle/>
-                <a:p>
-                  <a:pPr algn="r"/>
-                  <a:r>
-                    <a:rPr lang="en-US" b="1" dirty="0"/>
-                    <a:t>REPORTING</a:t>
-                  </a:r>
-                </a:p>
-              </p:txBody>
-            </p:sp>
-            <p:sp>
-              <p:nvSpPr>
-                <p:cNvPr id="89" name="TextBox 88"/>
-                <p:cNvSpPr txBox="1"/>
-                <p:nvPr/>
-              </p:nvSpPr>
-              <p:spPr>
-                <a:xfrm>
-                  <a:off x="1529941" y="1359349"/>
-                  <a:ext cx="2231548" cy="948655"/>
-                </a:xfrm>
-                <a:prstGeom prst="rect">
-                  <a:avLst/>
-                </a:prstGeom>
-                <a:noFill/>
-              </p:spPr>
-              <p:txBody>
-                <a:bodyPr wrap="square" rtlCol="0">
-                  <a:spAutoFit/>
-                </a:bodyPr>
-                <a:lstStyle/>
-                <a:p>
-                  <a:pPr marL="114300" indent="-114300">
-                    <a:buFont typeface="Arial" panose="020B0604020202020204" pitchFamily="34" charset="0"/>
-                    <a:buChar char="•"/>
-                  </a:pPr>
-                  <a:r>
-                    <a:rPr lang="en-US" sz="1350" dirty="0">
-                      <a:solidFill>
-                        <a:schemeClr val="accent4">
-                          <a:lumMod val="75000"/>
-                        </a:schemeClr>
-                      </a:solidFill>
-                    </a:rPr>
-                    <a:t>Public Health </a:t>
-                  </a:r>
-                </a:p>
-                <a:p>
-                  <a:pPr marL="114300" indent="-114300">
-                    <a:buFont typeface="Arial" panose="020B0604020202020204" pitchFamily="34" charset="0"/>
-                    <a:buChar char="•"/>
-                  </a:pPr>
-                  <a:r>
-                    <a:rPr lang="en-US" sz="1350" dirty="0">
-                      <a:solidFill>
-                        <a:schemeClr val="accent4">
-                          <a:lumMod val="75000"/>
-                        </a:schemeClr>
-                      </a:solidFill>
-                    </a:rPr>
-                    <a:t>Quality</a:t>
-                  </a:r>
-                </a:p>
-                <a:p>
-                  <a:pPr marL="114300" indent="-114300">
-                    <a:buFont typeface="Arial" panose="020B0604020202020204" pitchFamily="34" charset="0"/>
-                    <a:buChar char="•"/>
-                  </a:pPr>
-                  <a:r>
-                    <a:rPr lang="en-US" sz="1350" dirty="0">
-                      <a:solidFill>
-                        <a:schemeClr val="accent4">
-                          <a:lumMod val="75000"/>
-                        </a:schemeClr>
-                      </a:solidFill>
-                    </a:rPr>
-                    <a:t>Safety</a:t>
-                  </a:r>
-                </a:p>
-              </p:txBody>
-            </p:sp>
-          </p:grpSp>
-          <p:pic>
-            <p:nvPicPr>
-              <p:cNvPr id="12" name="Picture 11">
-                <a:extLst>
-                  <a:ext uri="{FF2B5EF4-FFF2-40B4-BE49-F238E27FC236}">
-                    <a16:creationId xmlns:a16="http://schemas.microsoft.com/office/drawing/2014/main" id="{4C55C224-0606-BE45-9634-AA28D6ED96FF}"/>
-                  </a:ext>
-                </a:extLst>
-              </p:cNvPr>
-              <p:cNvPicPr>
-                <a:picLocks noChangeAspect="1"/>
-              </p:cNvPicPr>
-              <p:nvPr/>
-            </p:nvPicPr>
-            <p:blipFill>
-              <a:blip r:embed="rId4">
-                <a:extLst>
-                  <a:ext uri="{28A0092B-C50C-407E-A947-70E740481C1C}">
-                    <a14:useLocalDpi xmlns:a14="http://schemas.microsoft.com/office/drawing/2010/main" val="0"/>
-                  </a:ext>
-                </a:extLst>
-              </a:blip>
-              <a:stretch>
-                <a:fillRect/>
-              </a:stretch>
-            </p:blipFill>
-            <p:spPr>
-              <a:xfrm>
-                <a:off x="483766" y="5116314"/>
-                <a:ext cx="1415072" cy="1193967"/>
-              </a:xfrm>
-              <a:prstGeom prst="rect">
-                <a:avLst/>
-              </a:prstGeom>
-              <a:noFill/>
-            </p:spPr>
-          </p:pic>
-        </p:grpSp>
-        <p:grpSp>
-          <p:nvGrpSpPr>
-            <p:cNvPr id="7" name="Group 6">
-              <a:extLst>
-                <a:ext uri="{FF2B5EF4-FFF2-40B4-BE49-F238E27FC236}">
-                  <a16:creationId xmlns:a16="http://schemas.microsoft.com/office/drawing/2014/main" id="{AF9B53AA-7153-0F49-B6CD-A55E887F2C34}"/>
-                </a:ext>
-              </a:extLst>
-            </p:cNvPr>
-            <p:cNvGrpSpPr/>
-            <p:nvPr/>
-          </p:nvGrpSpPr>
-          <p:grpSpPr>
-            <a:xfrm>
-              <a:off x="6305944" y="1423270"/>
-              <a:ext cx="2841269" cy="1532521"/>
-              <a:chOff x="6413141" y="1849632"/>
-              <a:chExt cx="2841269" cy="1532521"/>
-            </a:xfrm>
-          </p:grpSpPr>
-          <p:grpSp>
-            <p:nvGrpSpPr>
-              <p:cNvPr id="81" name="Group 80"/>
-              <p:cNvGrpSpPr/>
-              <p:nvPr/>
-            </p:nvGrpSpPr>
-            <p:grpSpPr>
-              <a:xfrm>
-                <a:off x="7466922" y="1961295"/>
-                <a:ext cx="1787488" cy="1420858"/>
-                <a:chOff x="1167350" y="547239"/>
-                <a:chExt cx="3052470" cy="1259319"/>
-              </a:xfrm>
-            </p:grpSpPr>
-            <p:sp>
-              <p:nvSpPr>
-                <p:cNvPr id="82" name="TextBox 81"/>
-                <p:cNvSpPr txBox="1"/>
-                <p:nvPr/>
-              </p:nvSpPr>
-              <p:spPr>
-                <a:xfrm>
-                  <a:off x="1167350" y="547239"/>
-                  <a:ext cx="2705382" cy="818355"/>
-                </a:xfrm>
-                <a:prstGeom prst="rect">
-                  <a:avLst/>
-                </a:prstGeom>
-                <a:noFill/>
-              </p:spPr>
-              <p:txBody>
-                <a:bodyPr wrap="square" rtlCol="0">
+                <a:bodyPr wrap="square" lIns="0" tIns="0" rIns="0" bIns="0" rtlCol="0">
                   <a:spAutoFit/>
                 </a:bodyPr>
                 <a:lstStyle/>
                 <a:p>
                   <a:r>
-                    <a:rPr lang="en-US" b="1" dirty="0"/>
-                    <a:t>CLINICAL DECISION SUPPORT</a:t>
+                    <a:rPr lang="en-US" sz="1300" dirty="0"/>
+                    <a:t>Patient, provider, population, public</a:t>
                   </a:r>
                 </a:p>
               </p:txBody>
             </p:sp>
-            <p:sp>
-              <p:nvSpPr>
-                <p:cNvPr id="83" name="TextBox 82"/>
-                <p:cNvSpPr txBox="1"/>
+            <p:pic>
+              <p:nvPicPr>
+                <p:cNvPr id="22" name="Picture 21">
+                  <a:extLst>
+                    <a:ext uri="{FF2B5EF4-FFF2-40B4-BE49-F238E27FC236}">
+                      <a16:creationId xmlns:a16="http://schemas.microsoft.com/office/drawing/2014/main" id="{25073671-7E75-7D4C-BA4E-711035196479}"/>
+                    </a:ext>
+                  </a:extLst>
+                </p:cNvPr>
+                <p:cNvPicPr>
+                  <a:picLocks noChangeAspect="1"/>
+                </p:cNvPicPr>
                 <p:nvPr/>
-              </p:nvSpPr>
+              </p:nvPicPr>
+              <p:blipFill>
+                <a:blip r:embed="rId7"/>
+                <a:stretch>
+                  <a:fillRect/>
+                </a:stretch>
+              </p:blipFill>
               <p:spPr>
                 <a:xfrm>
-                  <a:off x="1185301" y="1356463"/>
-                  <a:ext cx="3034519" cy="450095"/>
+                  <a:off x="2564322" y="3786299"/>
+                  <a:ext cx="799655" cy="649320"/>
                 </a:xfrm>
                 <a:prstGeom prst="rect">
                   <a:avLst/>
                 </a:prstGeom>
-                <a:noFill/>
               </p:spPr>
-              <p:txBody>
-                <a:bodyPr wrap="square" rtlCol="0">
-                  <a:spAutoFit/>
-                </a:bodyPr>
-                <a:lstStyle/>
-                <a:p>
-                  <a:r>
-                    <a:rPr lang="en-US" sz="1350" dirty="0">
-                      <a:solidFill>
-                        <a:schemeClr val="accent4">
-                          <a:lumMod val="75000"/>
-                        </a:schemeClr>
-                      </a:solidFill>
-                    </a:rPr>
-                    <a:t>MAKING it happen within local workflow.</a:t>
-                  </a:r>
-                </a:p>
-              </p:txBody>
-            </p:sp>
+            </p:pic>
           </p:grpSp>
-          <p:pic>
-            <p:nvPicPr>
-              <p:cNvPr id="8" name="Picture 7">
-                <a:extLst>
-                  <a:ext uri="{FF2B5EF4-FFF2-40B4-BE49-F238E27FC236}">
-                    <a16:creationId xmlns:a16="http://schemas.microsoft.com/office/drawing/2014/main" id="{D80FE52C-775C-C84D-8228-FC0F53271C35}"/>
-                  </a:ext>
-                </a:extLst>
-              </p:cNvPr>
-              <p:cNvPicPr>
-                <a:picLocks noChangeAspect="1"/>
-              </p:cNvPicPr>
-              <p:nvPr/>
-            </p:nvPicPr>
-            <p:blipFill>
-              <a:blip r:embed="rId5">
-                <a:extLst>
-                  <a:ext uri="{28A0092B-C50C-407E-A947-70E740481C1C}">
-                    <a14:useLocalDpi xmlns:a14="http://schemas.microsoft.com/office/drawing/2010/main" val="0"/>
-                  </a:ext>
-                </a:extLst>
-              </a:blip>
-              <a:stretch>
-                <a:fillRect/>
-              </a:stretch>
-            </p:blipFill>
-            <p:spPr>
-              <a:xfrm>
-                <a:off x="6413141" y="2088053"/>
-                <a:ext cx="1259025" cy="1259025"/>
-              </a:xfrm>
-              <a:prstGeom prst="rect">
-                <a:avLst/>
-              </a:prstGeom>
-            </p:spPr>
-          </p:pic>
-          <p:sp>
-            <p:nvSpPr>
-              <p:cNvPr id="5" name="Rectangle 4">
-                <a:extLst>
-                  <a:ext uri="{FF2B5EF4-FFF2-40B4-BE49-F238E27FC236}">
-                    <a16:creationId xmlns:a16="http://schemas.microsoft.com/office/drawing/2014/main" id="{4E1766EA-3FD6-884A-9E04-21556AF66341}"/>
-                  </a:ext>
-                </a:extLst>
-              </p:cNvPr>
-              <p:cNvSpPr/>
-              <p:nvPr/>
-            </p:nvSpPr>
-            <p:spPr>
-              <a:xfrm>
-                <a:off x="6466679" y="1849632"/>
-                <a:ext cx="2638097" cy="1532521"/>
-              </a:xfrm>
-              <a:prstGeom prst="rect">
-                <a:avLst/>
-              </a:prstGeom>
-              <a:noFill/>
-              <a:ln w="15875"/>
-            </p:spPr>
-            <p:style>
-              <a:lnRef idx="2">
-                <a:schemeClr val="accent1">
-                  <a:shade val="50000"/>
-                </a:schemeClr>
-              </a:lnRef>
-              <a:fillRef idx="1">
-                <a:schemeClr val="accent1"/>
-              </a:fillRef>
-              <a:effectRef idx="0">
-                <a:schemeClr val="accent1"/>
-              </a:effectRef>
-              <a:fontRef idx="minor">
-                <a:schemeClr val="lt1"/>
-              </a:fontRef>
-            </p:style>
-            <p:txBody>
-              <a:bodyPr rtlCol="0" anchor="ctr"/>
-              <a:lstStyle/>
-              <a:p>
-                <a:pPr algn="ctr"/>
-                <a:endParaRPr lang="en-US"/>
-              </a:p>
-            </p:txBody>
-          </p:sp>
         </p:grpSp>
-        <p:grpSp>
-          <p:nvGrpSpPr>
-            <p:cNvPr id="9" name="Group 8">
+        <p:sp>
+          <p:nvSpPr>
+            <p:cNvPr id="39" name="TextBox 38">
               <a:extLst>
                 <a:ext uri="{FF2B5EF4-FFF2-40B4-BE49-F238E27FC236}">
-                  <a16:creationId xmlns:a16="http://schemas.microsoft.com/office/drawing/2014/main" id="{E2463DC9-C19E-3F44-A3E3-0C9F286DFFBD}"/>
+                  <a16:creationId xmlns:a16="http://schemas.microsoft.com/office/drawing/2014/main" id="{FAA74910-E126-4752-81EB-3D85AC67026C}"/>
                 </a:ext>
               </a:extLst>
             </p:cNvPr>
-            <p:cNvGrpSpPr/>
+            <p:cNvSpPr txBox="1"/>
             <p:nvPr/>
-          </p:nvGrpSpPr>
-          <p:grpSpPr>
+          </p:nvSpPr>
+          <p:spPr>
             <a:xfrm>
-              <a:off x="6382307" y="4675919"/>
-              <a:ext cx="2541821" cy="1966315"/>
-              <a:chOff x="6045132" y="3907081"/>
-              <a:chExt cx="2541821" cy="1966315"/>
+              <a:off x="7881580" y="3283890"/>
+              <a:ext cx="1193912" cy="584775"/>
             </a:xfrm>
-          </p:grpSpPr>
-          <p:grpSp>
-            <p:nvGrpSpPr>
-              <p:cNvPr id="84" name="Group 83"/>
-              <p:cNvGrpSpPr/>
-              <p:nvPr/>
-            </p:nvGrpSpPr>
-            <p:grpSpPr>
-              <a:xfrm>
-                <a:off x="6326147" y="4592873"/>
-                <a:ext cx="2260806" cy="1280523"/>
-                <a:chOff x="972456" y="867060"/>
-                <a:chExt cx="3795312" cy="1707362"/>
-              </a:xfrm>
-            </p:grpSpPr>
-            <p:sp>
-              <p:nvSpPr>
-                <p:cNvPr id="85" name="TextBox 84"/>
-                <p:cNvSpPr txBox="1"/>
-                <p:nvPr/>
-              </p:nvSpPr>
-              <p:spPr>
-                <a:xfrm>
-                  <a:off x="972456" y="867060"/>
-                  <a:ext cx="3795312" cy="492442"/>
-                </a:xfrm>
-                <a:prstGeom prst="rect">
-                  <a:avLst/>
-                </a:prstGeom>
-                <a:noFill/>
-              </p:spPr>
-              <p:txBody>
-                <a:bodyPr wrap="square" rtlCol="0">
-                  <a:spAutoFit/>
-                </a:bodyPr>
-                <a:lstStyle/>
-                <a:p>
-                  <a:r>
-                    <a:rPr lang="en-US" b="1" dirty="0"/>
-                    <a:t>MEASUREMENT ANALYTICS</a:t>
-                  </a:r>
-                </a:p>
-              </p:txBody>
-            </p:sp>
-            <p:sp>
-              <p:nvSpPr>
-                <p:cNvPr id="86" name="TextBox 85"/>
-                <p:cNvSpPr txBox="1"/>
-                <p:nvPr/>
-              </p:nvSpPr>
-              <p:spPr>
-                <a:xfrm>
-                  <a:off x="972456" y="1620315"/>
-                  <a:ext cx="3296624" cy="954107"/>
-                </a:xfrm>
-                <a:prstGeom prst="rect">
-                  <a:avLst/>
-                </a:prstGeom>
-                <a:noFill/>
-              </p:spPr>
-              <p:txBody>
-                <a:bodyPr wrap="square" rtlCol="0">
-                  <a:spAutoFit/>
-                </a:bodyPr>
-                <a:lstStyle/>
-                <a:p>
-                  <a:r>
-                    <a:rPr lang="en-US" sz="1350" dirty="0">
-                      <a:solidFill>
-                        <a:schemeClr val="accent4">
-                          <a:lumMod val="75000"/>
-                        </a:schemeClr>
-                      </a:solidFill>
-                    </a:rPr>
-                    <a:t>What DID happen? What processes and outcomes have been achieved? </a:t>
-                  </a:r>
-                </a:p>
-              </p:txBody>
-            </p:sp>
-          </p:grpSp>
-          <p:pic>
-            <p:nvPicPr>
-              <p:cNvPr id="10" name="Picture 9">
-                <a:extLst>
-                  <a:ext uri="{FF2B5EF4-FFF2-40B4-BE49-F238E27FC236}">
-                    <a16:creationId xmlns:a16="http://schemas.microsoft.com/office/drawing/2014/main" id="{D1031565-17EA-5742-8E2C-1558F08FF0DD}"/>
-                  </a:ext>
-                </a:extLst>
-              </p:cNvPr>
-              <p:cNvPicPr>
-                <a:picLocks noChangeAspect="1"/>
-              </p:cNvPicPr>
-              <p:nvPr/>
-            </p:nvPicPr>
-            <p:blipFill>
-              <a:blip r:embed="rId6">
-                <a:extLst>
-                  <a:ext uri="{28A0092B-C50C-407E-A947-70E740481C1C}">
-                    <a14:useLocalDpi xmlns:a14="http://schemas.microsoft.com/office/drawing/2010/main" val="0"/>
-                  </a:ext>
-                </a:extLst>
-              </a:blip>
-              <a:stretch>
-                <a:fillRect/>
-              </a:stretch>
-            </p:blipFill>
-            <p:spPr>
-              <a:xfrm>
-                <a:off x="6497513" y="3907081"/>
-                <a:ext cx="1160297" cy="797705"/>
-              </a:xfrm>
-              <a:prstGeom prst="rect">
-                <a:avLst/>
-              </a:prstGeom>
-            </p:spPr>
-          </p:pic>
-          <p:sp>
-            <p:nvSpPr>
-              <p:cNvPr id="48" name="Rectangle 47">
-                <a:extLst>
-                  <a:ext uri="{FF2B5EF4-FFF2-40B4-BE49-F238E27FC236}">
-                    <a16:creationId xmlns:a16="http://schemas.microsoft.com/office/drawing/2014/main" id="{28BDEEA5-E908-3D40-AC4D-8834BA8B4896}"/>
-                  </a:ext>
-                </a:extLst>
-              </p:cNvPr>
-              <p:cNvSpPr/>
-              <p:nvPr/>
-            </p:nvSpPr>
-            <p:spPr>
-              <a:xfrm>
-                <a:off x="6045132" y="3907081"/>
-                <a:ext cx="2349985" cy="1923656"/>
-              </a:xfrm>
-              <a:prstGeom prst="rect">
-                <a:avLst/>
-              </a:prstGeom>
-              <a:noFill/>
-              <a:ln w="15875"/>
-            </p:spPr>
-            <p:style>
-              <a:lnRef idx="2">
-                <a:schemeClr val="accent1">
-                  <a:shade val="50000"/>
-                </a:schemeClr>
-              </a:lnRef>
-              <a:fillRef idx="1">
-                <a:schemeClr val="accent1"/>
-              </a:fillRef>
-              <a:effectRef idx="0">
-                <a:schemeClr val="accent1"/>
-              </a:effectRef>
-              <a:fontRef idx="minor">
-                <a:schemeClr val="lt1"/>
-              </a:fontRef>
-            </p:style>
-            <p:txBody>
-              <a:bodyPr rtlCol="0" anchor="ctr"/>
-              <a:lstStyle/>
-              <a:p>
-                <a:pPr algn="ctr"/>
-                <a:endParaRPr lang="en-US"/>
-              </a:p>
-            </p:txBody>
-          </p:sp>
-        </p:grpSp>
+            <a:prstGeom prst="rect">
+              <a:avLst/>
+            </a:prstGeom>
+            <a:noFill/>
+          </p:spPr>
+          <p:txBody>
+            <a:bodyPr wrap="square" rtlCol="0">
+              <a:spAutoFit/>
+            </a:bodyPr>
+            <a:lstStyle/>
+            <a:p>
+              <a:r>
+                <a:rPr lang="en-US" sz="1600" b="1" dirty="0"/>
+                <a:t>4. CLINICAL CARE</a:t>
+              </a:r>
+            </a:p>
+          </p:txBody>
+        </p:sp>
+        <p:sp>
+          <p:nvSpPr>
+            <p:cNvPr id="40" name="TextBox 39">
+              <a:extLst>
+                <a:ext uri="{FF2B5EF4-FFF2-40B4-BE49-F238E27FC236}">
+                  <a16:creationId xmlns:a16="http://schemas.microsoft.com/office/drawing/2014/main" id="{AB03C1E6-0107-4AC9-8FFA-046535EA0CCE}"/>
+                </a:ext>
+              </a:extLst>
+            </p:cNvPr>
+            <p:cNvSpPr txBox="1"/>
+            <p:nvPr/>
+          </p:nvSpPr>
+          <p:spPr>
+            <a:xfrm>
+              <a:off x="7941624" y="3751889"/>
+              <a:ext cx="1342467" cy="461665"/>
+            </a:xfrm>
+            <a:prstGeom prst="rect">
+              <a:avLst/>
+            </a:prstGeom>
+            <a:noFill/>
+          </p:spPr>
+          <p:txBody>
+            <a:bodyPr wrap="square" rtlCol="0">
+              <a:spAutoFit/>
+            </a:bodyPr>
+            <a:lstStyle/>
+            <a:p>
+              <a:r>
+                <a:rPr lang="en-US" sz="1200" dirty="0">
+                  <a:solidFill>
+                    <a:schemeClr val="accent4">
+                      <a:lumMod val="75000"/>
+                    </a:schemeClr>
+                  </a:solidFill>
+                </a:rPr>
+                <a:t>Clinician and Patient Workflow.</a:t>
+              </a:r>
+            </a:p>
+          </p:txBody>
+        </p:sp>
+        <p:pic>
+          <p:nvPicPr>
+            <p:cNvPr id="17" name="Picture 16">
+              <a:extLst>
+                <a:ext uri="{FF2B5EF4-FFF2-40B4-BE49-F238E27FC236}">
+                  <a16:creationId xmlns:a16="http://schemas.microsoft.com/office/drawing/2014/main" id="{0692404C-A200-464C-A595-EB78227D1D24}"/>
+                </a:ext>
+              </a:extLst>
+            </p:cNvPr>
+            <p:cNvPicPr>
+              <a:picLocks noChangeAspect="1"/>
+            </p:cNvPicPr>
+            <p:nvPr/>
+          </p:nvPicPr>
+          <p:blipFill>
+            <a:blip r:embed="rId8" cstate="print">
+              <a:extLst>
+                <a:ext uri="{28A0092B-C50C-407E-A947-70E740481C1C}">
+                  <a14:useLocalDpi xmlns:a14="http://schemas.microsoft.com/office/drawing/2010/main" val="0"/>
+                </a:ext>
+              </a:extLst>
+            </a:blip>
+            <a:stretch>
+              <a:fillRect/>
+            </a:stretch>
+          </p:blipFill>
+          <p:spPr>
+            <a:xfrm>
+              <a:off x="7018642" y="3461320"/>
+              <a:ext cx="1045989" cy="634131"/>
+            </a:xfrm>
+            <a:prstGeom prst="rect">
+              <a:avLst/>
+            </a:prstGeom>
+          </p:spPr>
+        </p:pic>
         <p:cxnSp>
           <p:nvCxnSpPr>
-            <p:cNvPr id="15" name="Straight Arrow Connector 14">
+            <p:cNvPr id="46" name="Straight Arrow Connector 45">
               <a:extLst>
                 <a:ext uri="{FF2B5EF4-FFF2-40B4-BE49-F238E27FC236}">
-                  <a16:creationId xmlns:a16="http://schemas.microsoft.com/office/drawing/2014/main" id="{1B43913B-C38A-D149-9826-4673CB7D77FF}"/>
+                  <a16:creationId xmlns:a16="http://schemas.microsoft.com/office/drawing/2014/main" id="{F8B57348-9D17-4C86-ACB6-71537A886377}"/>
                 </a:ext>
               </a:extLst>
             </p:cNvPr>
@@ -11449,19 +11725,20 @@
             <p:nvPr/>
           </p:nvCxnSpPr>
           <p:spPr>
-            <a:xfrm>
-              <a:off x="2585545" y="1781223"/>
-              <a:ext cx="945223" cy="0"/>
+            <a:xfrm flipH="1">
+              <a:off x="6397186" y="3699389"/>
+              <a:ext cx="658036" cy="0"/>
             </a:xfrm>
             <a:prstGeom prst="straightConnector1">
               <a:avLst/>
             </a:prstGeom>
-            <a:ln w="79375">
+            <a:ln w="60325">
               <a:solidFill>
                 <a:schemeClr val="bg2">
-                  <a:lumMod val="50000"/>
+                  <a:lumMod val="75000"/>
                 </a:schemeClr>
               </a:solidFill>
+              <a:headEnd type="triangle"/>
               <a:tailEnd type="triangle"/>
             </a:ln>
           </p:spPr>
@@ -11480,276 +11757,6 @@
             </a:fontRef>
           </p:style>
         </p:cxnSp>
-        <p:cxnSp>
-          <p:nvCxnSpPr>
-            <p:cNvPr id="54" name="Straight Arrow Connector 53">
-              <a:extLst>
-                <a:ext uri="{FF2B5EF4-FFF2-40B4-BE49-F238E27FC236}">
-                  <a16:creationId xmlns:a16="http://schemas.microsoft.com/office/drawing/2014/main" id="{1600A01D-F136-624F-A54F-BAE4E59C344B}"/>
-                </a:ext>
-              </a:extLst>
-            </p:cNvPr>
-            <p:cNvCxnSpPr/>
-            <p:nvPr/>
-          </p:nvCxnSpPr>
-          <p:spPr>
-            <a:xfrm>
-              <a:off x="5362624" y="1781223"/>
-              <a:ext cx="713996" cy="0"/>
-            </a:xfrm>
-            <a:prstGeom prst="straightConnector1">
-              <a:avLst/>
-            </a:prstGeom>
-            <a:ln w="79375">
-              <a:solidFill>
-                <a:schemeClr val="bg2">
-                  <a:lumMod val="50000"/>
-                </a:schemeClr>
-              </a:solidFill>
-              <a:tailEnd type="triangle"/>
-            </a:ln>
-          </p:spPr>
-          <p:style>
-            <a:lnRef idx="1">
-              <a:schemeClr val="accent1"/>
-            </a:lnRef>
-            <a:fillRef idx="0">
-              <a:schemeClr val="accent1"/>
-            </a:fillRef>
-            <a:effectRef idx="0">
-              <a:schemeClr val="accent1"/>
-            </a:effectRef>
-            <a:fontRef idx="minor">
-              <a:schemeClr val="tx1"/>
-            </a:fontRef>
-          </p:style>
-        </p:cxnSp>
-        <p:cxnSp>
-          <p:nvCxnSpPr>
-            <p:cNvPr id="55" name="Straight Arrow Connector 54">
-              <a:extLst>
-                <a:ext uri="{FF2B5EF4-FFF2-40B4-BE49-F238E27FC236}">
-                  <a16:creationId xmlns:a16="http://schemas.microsoft.com/office/drawing/2014/main" id="{EBFD61F8-1179-C446-B4E4-A91E6A39733E}"/>
-                </a:ext>
-              </a:extLst>
-            </p:cNvPr>
-            <p:cNvCxnSpPr>
-              <a:cxnSpLocks/>
-            </p:cNvCxnSpPr>
-            <p:nvPr/>
-          </p:nvCxnSpPr>
-          <p:spPr>
-            <a:xfrm>
-              <a:off x="7645194" y="3429000"/>
-              <a:ext cx="22825" cy="839617"/>
-            </a:xfrm>
-            <a:prstGeom prst="straightConnector1">
-              <a:avLst/>
-            </a:prstGeom>
-            <a:ln w="79375">
-              <a:solidFill>
-                <a:schemeClr val="bg2">
-                  <a:lumMod val="50000"/>
-                </a:schemeClr>
-              </a:solidFill>
-              <a:tailEnd type="triangle"/>
-            </a:ln>
-          </p:spPr>
-          <p:style>
-            <a:lnRef idx="1">
-              <a:schemeClr val="accent1"/>
-            </a:lnRef>
-            <a:fillRef idx="0">
-              <a:schemeClr val="accent1"/>
-            </a:fillRef>
-            <a:effectRef idx="0">
-              <a:schemeClr val="accent1"/>
-            </a:effectRef>
-            <a:fontRef idx="minor">
-              <a:schemeClr val="tx1"/>
-            </a:fontRef>
-          </p:style>
-        </p:cxnSp>
-        <p:cxnSp>
-          <p:nvCxnSpPr>
-            <p:cNvPr id="57" name="Straight Arrow Connector 56">
-              <a:extLst>
-                <a:ext uri="{FF2B5EF4-FFF2-40B4-BE49-F238E27FC236}">
-                  <a16:creationId xmlns:a16="http://schemas.microsoft.com/office/drawing/2014/main" id="{52940CBA-9C0F-3B46-A29F-CDEB10EE50EB}"/>
-                </a:ext>
-              </a:extLst>
-            </p:cNvPr>
-            <p:cNvCxnSpPr>
-              <a:cxnSpLocks/>
-            </p:cNvCxnSpPr>
-            <p:nvPr/>
-          </p:nvCxnSpPr>
-          <p:spPr>
-            <a:xfrm flipH="1">
-              <a:off x="4621947" y="5469759"/>
-              <a:ext cx="1280338" cy="0"/>
-            </a:xfrm>
-            <a:prstGeom prst="straightConnector1">
-              <a:avLst/>
-            </a:prstGeom>
-            <a:ln w="79375">
-              <a:solidFill>
-                <a:schemeClr val="bg2">
-                  <a:lumMod val="50000"/>
-                </a:schemeClr>
-              </a:solidFill>
-              <a:tailEnd type="triangle"/>
-            </a:ln>
-          </p:spPr>
-          <p:style>
-            <a:lnRef idx="1">
-              <a:schemeClr val="accent1"/>
-            </a:lnRef>
-            <a:fillRef idx="0">
-              <a:schemeClr val="accent1"/>
-            </a:fillRef>
-            <a:effectRef idx="0">
-              <a:schemeClr val="accent1"/>
-            </a:effectRef>
-            <a:fontRef idx="minor">
-              <a:schemeClr val="tx1"/>
-            </a:fontRef>
-          </p:style>
-        </p:cxnSp>
-        <p:cxnSp>
-          <p:nvCxnSpPr>
-            <p:cNvPr id="19" name="Elbow Connector 18">
-              <a:extLst>
-                <a:ext uri="{FF2B5EF4-FFF2-40B4-BE49-F238E27FC236}">
-                  <a16:creationId xmlns:a16="http://schemas.microsoft.com/office/drawing/2014/main" id="{191CB074-DD2B-5146-B8A1-FAAC124E56D9}"/>
-                </a:ext>
-              </a:extLst>
-            </p:cNvPr>
-            <p:cNvCxnSpPr>
-              <a:cxnSpLocks/>
-            </p:cNvCxnSpPr>
-            <p:nvPr/>
-          </p:nvCxnSpPr>
-          <p:spPr>
-            <a:xfrm rot="16200000" flipV="1">
-              <a:off x="791853" y="4295968"/>
-              <a:ext cx="1911257" cy="400063"/>
-            </a:xfrm>
-            <a:prstGeom prst="bentConnector3">
-              <a:avLst>
-                <a:gd name="adj1" fmla="val 1607"/>
-              </a:avLst>
-            </a:prstGeom>
-            <a:ln w="79375">
-              <a:solidFill>
-                <a:schemeClr val="bg2">
-                  <a:lumMod val="50000"/>
-                </a:schemeClr>
-              </a:solidFill>
-              <a:tailEnd type="triangle"/>
-            </a:ln>
-          </p:spPr>
-          <p:style>
-            <a:lnRef idx="1">
-              <a:schemeClr val="accent1"/>
-            </a:lnRef>
-            <a:fillRef idx="0">
-              <a:schemeClr val="accent1"/>
-            </a:fillRef>
-            <a:effectRef idx="0">
-              <a:schemeClr val="accent1"/>
-            </a:effectRef>
-            <a:fontRef idx="minor">
-              <a:schemeClr val="tx1"/>
-            </a:fontRef>
-          </p:style>
-        </p:cxnSp>
-        <p:grpSp>
-          <p:nvGrpSpPr>
-            <p:cNvPr id="30" name="Group 29">
-              <a:extLst>
-                <a:ext uri="{FF2B5EF4-FFF2-40B4-BE49-F238E27FC236}">
-                  <a16:creationId xmlns:a16="http://schemas.microsoft.com/office/drawing/2014/main" id="{FB7EB641-3695-8A4C-8168-3059CE27A590}"/>
-                </a:ext>
-              </a:extLst>
-            </p:cNvPr>
-            <p:cNvGrpSpPr/>
-            <p:nvPr/>
-          </p:nvGrpSpPr>
-          <p:grpSpPr>
-            <a:xfrm>
-              <a:off x="3008230" y="3754769"/>
-              <a:ext cx="3491483" cy="649320"/>
-              <a:chOff x="2976700" y="3786299"/>
-              <a:chExt cx="3491483" cy="649320"/>
-            </a:xfrm>
-          </p:grpSpPr>
-          <p:sp>
-            <p:nvSpPr>
-              <p:cNvPr id="2" name="TextBox 1">
-                <a:extLst>
-                  <a:ext uri="{FF2B5EF4-FFF2-40B4-BE49-F238E27FC236}">
-                    <a16:creationId xmlns:a16="http://schemas.microsoft.com/office/drawing/2014/main" id="{3F17351A-ACC6-C64E-AB36-8DD4397BE8BC}"/>
-                  </a:ext>
-                </a:extLst>
-              </p:cNvPr>
-              <p:cNvSpPr txBox="1"/>
-              <p:nvPr/>
-            </p:nvSpPr>
-            <p:spPr>
-              <a:xfrm>
-                <a:off x="3756068" y="4001402"/>
-                <a:ext cx="2712115" cy="200055"/>
-              </a:xfrm>
-              <a:prstGeom prst="rect">
-                <a:avLst/>
-              </a:prstGeom>
-              <a:noFill/>
-            </p:spPr>
-            <p:txBody>
-              <a:bodyPr wrap="square" lIns="0" tIns="0" rIns="0" bIns="0" rtlCol="0">
-                <a:spAutoFit/>
-              </a:bodyPr>
-              <a:lstStyle/>
-              <a:p>
-                <a:r>
-                  <a:rPr lang="en-US" sz="1300" dirty="0"/>
-                  <a:t>Patient, provider, population, public</a:t>
-                </a:r>
-              </a:p>
-            </p:txBody>
-          </p:sp>
-          <p:pic>
-            <p:nvPicPr>
-              <p:cNvPr id="22" name="Picture 21">
-                <a:extLst>
-                  <a:ext uri="{FF2B5EF4-FFF2-40B4-BE49-F238E27FC236}">
-                    <a16:creationId xmlns:a16="http://schemas.microsoft.com/office/drawing/2014/main" id="{25073671-7E75-7D4C-BA4E-711035196479}"/>
-                  </a:ext>
-                </a:extLst>
-              </p:cNvPr>
-              <p:cNvPicPr>
-                <a:picLocks noChangeAspect="1"/>
-              </p:cNvPicPr>
-              <p:nvPr/>
-            </p:nvPicPr>
-            <p:blipFill>
-              <a:blip r:embed="rId7"/>
-              <a:stretch>
-                <a:fillRect/>
-              </a:stretch>
-            </p:blipFill>
-            <p:spPr>
-              <a:xfrm>
-                <a:off x="2976700" y="3786299"/>
-                <a:ext cx="799655" cy="649320"/>
-              </a:xfrm>
-              <a:prstGeom prst="rect">
-                <a:avLst/>
-              </a:prstGeom>
-            </p:spPr>
-          </p:pic>
-        </p:grpSp>
       </p:grpSp>
     </p:spTree>
     <p:extLst>
@@ -11791,10 +11798,10 @@
       </p:grpSpPr>
       <p:pic>
         <p:nvPicPr>
-          <p:cNvPr id="5" name="Picture 4">
+          <p:cNvPr id="2" name="Picture 1">
             <a:extLst>
               <a:ext uri="{FF2B5EF4-FFF2-40B4-BE49-F238E27FC236}">
-                <a16:creationId xmlns:a16="http://schemas.microsoft.com/office/drawing/2014/main" id="{1010450B-21B6-094E-9071-4287E17F3CCC}"/>
+                <a16:creationId xmlns:a16="http://schemas.microsoft.com/office/drawing/2014/main" id="{A4C72069-A5D3-4B77-A2AF-B9D2F201DA37}"/>
               </a:ext>
             </a:extLst>
           </p:cNvPr>
@@ -11811,8 +11818,8 @@
         </p:blipFill>
         <p:spPr>
           <a:xfrm>
-            <a:off x="218779" y="0"/>
-            <a:ext cx="8706446" cy="6858001"/>
+            <a:off x="246513" y="219178"/>
+            <a:ext cx="8650974" cy="6419644"/>
           </a:xfrm>
           <a:prstGeom prst="rect">
             <a:avLst/>
@@ -11823,6 +11830,106 @@
     <p:extLst>
       <p:ext uri="{BB962C8B-B14F-4D97-AF65-F5344CB8AC3E}">
         <p14:creationId xmlns:p14="http://schemas.microsoft.com/office/powerpoint/2010/main" val="771653715"/>
+      </p:ext>
+    </p:extLst>
+  </p:cSld>
+  <p:clrMapOvr>
+    <a:masterClrMapping/>
+  </p:clrMapOvr>
+</p:sld>
+</file>
+
+<file path=ppt/slides/slide4.xml><?xml version="1.0" encoding="utf-8"?>
+<p:sld xmlns:a="http://schemas.openxmlformats.org/drawingml/2006/main" xmlns:r="http://schemas.openxmlformats.org/officeDocument/2006/relationships" xmlns:p="http://schemas.openxmlformats.org/presentationml/2006/main">
+  <p:cSld>
+    <p:bg>
+      <p:bgPr>
+        <a:solidFill>
+          <a:schemeClr val="bg1"/>
+        </a:solidFill>
+        <a:effectLst/>
+      </p:bgPr>
+    </p:bg>
+    <p:spTree>
+      <p:nvGrpSpPr>
+        <p:cNvPr id="1" name=""/>
+        <p:cNvGrpSpPr/>
+        <p:nvPr/>
+      </p:nvGrpSpPr>
+      <p:grpSpPr>
+        <a:xfrm>
+          <a:off x="0" y="0"/>
+          <a:ext cx="0" cy="0"/>
+          <a:chOff x="0" y="0"/>
+          <a:chExt cx="0" cy="0"/>
+        </a:xfrm>
+      </p:grpSpPr>
+      <p:pic>
+        <p:nvPicPr>
+          <p:cNvPr id="3" name="Picture 2">
+            <a:extLst>
+              <a:ext uri="{FF2B5EF4-FFF2-40B4-BE49-F238E27FC236}">
+                <a16:creationId xmlns:a16="http://schemas.microsoft.com/office/drawing/2014/main" id="{B0D9AC72-C69F-B04C-8662-BC4E95F0685F}"/>
+              </a:ext>
+            </a:extLst>
+          </p:cNvPr>
+          <p:cNvPicPr>
+            <a:picLocks noChangeAspect="1"/>
+          </p:cNvPicPr>
+          <p:nvPr/>
+        </p:nvPicPr>
+        <p:blipFill>
+          <a:blip r:embed="rId2"/>
+          <a:stretch>
+            <a:fillRect/>
+          </a:stretch>
+        </p:blipFill>
+        <p:spPr>
+          <a:xfrm>
+            <a:off x="247650" y="222250"/>
+            <a:ext cx="8648700" cy="6413500"/>
+          </a:xfrm>
+          <a:prstGeom prst="rect">
+            <a:avLst/>
+          </a:prstGeom>
+        </p:spPr>
+      </p:pic>
+      <p:sp>
+        <p:nvSpPr>
+          <p:cNvPr id="4" name="TextBox 3">
+            <a:extLst>
+              <a:ext uri="{FF2B5EF4-FFF2-40B4-BE49-F238E27FC236}">
+                <a16:creationId xmlns:a16="http://schemas.microsoft.com/office/drawing/2014/main" id="{00883092-DFF1-1D40-B226-9BC433CD0E5D}"/>
+              </a:ext>
+            </a:extLst>
+          </p:cNvPr>
+          <p:cNvSpPr txBox="1"/>
+          <p:nvPr/>
+        </p:nvSpPr>
+        <p:spPr>
+          <a:xfrm>
+            <a:off x="7493876" y="94593"/>
+            <a:ext cx="184731" cy="369332"/>
+          </a:xfrm>
+          <a:prstGeom prst="rect">
+            <a:avLst/>
+          </a:prstGeom>
+          <a:noFill/>
+        </p:spPr>
+        <p:txBody>
+          <a:bodyPr wrap="none" rtlCol="0">
+            <a:spAutoFit/>
+          </a:bodyPr>
+          <a:lstStyle/>
+          <a:p>
+            <a:endParaRPr lang="en-US"/>
+          </a:p>
+        </p:txBody>
+      </p:sp>
+    </p:spTree>
+    <p:extLst>
+      <p:ext uri="{BB962C8B-B14F-4D97-AF65-F5344CB8AC3E}">
+        <p14:creationId xmlns:p14="http://schemas.microsoft.com/office/powerpoint/2010/main" val="625858159"/>
       </p:ext>
     </p:extLst>
   </p:cSld>

</xml_diff>